<commit_message>
Updated PPT and Screenshot Removed
</commit_message>
<xml_diff>
--- a/Satish.pptx
+++ b/Satish.pptx
@@ -13,6 +13,7 @@
     <p:sldId id="261" r:id="rId7"/>
     <p:sldId id="262" r:id="rId8"/>
     <p:sldId id="263" r:id="rId9"/>
+    <p:sldId id="266" r:id="rId10"/>
   </p:sldIdLst>
   <p:sldSz cx="12192000" cy="6858000"/>
   <p:notesSz cx="6858000" cy="9144000"/>
@@ -19858,7 +19859,7 @@
           <a:p>
             <a:r>
               <a:rPr lang="en-US" dirty="0"/>
-              <a:t>OPENCV</a:t>
+              <a:t>OpenCV</a:t>
             </a:r>
           </a:p>
         </p:txBody>
@@ -26254,7 +26255,7 @@
       </p:grpSpPr>
       <p:sp>
         <p:nvSpPr>
-          <p:cNvPr id="9" name="Rectangle 8">
+          <p:cNvPr id="30" name="Rectangle 29">
             <a:extLst>
               <a:ext uri="{FF2B5EF4-FFF2-40B4-BE49-F238E27FC236}">
                 <a16:creationId xmlns:a16="http://schemas.microsoft.com/office/drawing/2014/main" id="{09646535-AEF6-4883-A4F9-EEC1F8B4319E}"/>
@@ -26323,10 +26324,10 @@
       </p:sp>
       <p:sp useBgFill="1">
         <p:nvSpPr>
-          <p:cNvPr id="11" name="Rectangle 10">
+          <p:cNvPr id="32" name="Rectangle 31">
             <a:extLst>
               <a:ext uri="{FF2B5EF4-FFF2-40B4-BE49-F238E27FC236}">
-                <a16:creationId xmlns:a16="http://schemas.microsoft.com/office/drawing/2014/main" id="{A20E4EF1-6AA9-4634-A88F-49303780651A}"/>
+                <a16:creationId xmlns:a16="http://schemas.microsoft.com/office/drawing/2014/main" id="{566907AD-466D-452C-AB75-0106CB261D25}"/>
               </a:ext>
               <a:ext uri="{C183D7F6-B498-43B3-948B-1728B52AA6E4}">
                 <adec:decorative xmlns:adec="http://schemas.microsoft.com/office/drawing/2017/decorative" val="1"/>
@@ -26386,10 +26387,10 @@
       </p:sp>
       <p:sp>
         <p:nvSpPr>
-          <p:cNvPr id="13" name="Rectangle 12">
+          <p:cNvPr id="34" name="Rectangle 33">
             <a:extLst>
               <a:ext uri="{FF2B5EF4-FFF2-40B4-BE49-F238E27FC236}">
-                <a16:creationId xmlns:a16="http://schemas.microsoft.com/office/drawing/2014/main" id="{DD0558E7-61D4-43D8-ADB8-96DE97118653}"/>
+                <a16:creationId xmlns:a16="http://schemas.microsoft.com/office/drawing/2014/main" id="{919AA3C9-01B9-4096-8BC9-60F493F1A8E4}"/>
               </a:ext>
               <a:ext uri="{C183D7F6-B498-43B3-948B-1728B52AA6E4}">
                 <adec:decorative xmlns:adec="http://schemas.microsoft.com/office/drawing/2017/decorative" val="1"/>
@@ -26471,19 +26472,19 @@
         </p:nvSpPr>
         <p:spPr>
           <a:xfrm>
-            <a:off x="1349567" y="619199"/>
-            <a:ext cx="9492866" cy="492443"/>
+            <a:off x="720000" y="1554630"/>
+            <a:ext cx="5015638" cy="1969770"/>
           </a:xfrm>
         </p:spPr>
         <p:txBody>
-          <a:bodyPr vert="horz" wrap="square" lIns="0" tIns="0" rIns="0" bIns="0" rtlCol="0" anchor="t" anchorCtr="0">
-            <a:normAutofit fontScale="90000"/>
+          <a:bodyPr vert="horz" wrap="square" lIns="0" tIns="0" rIns="0" bIns="0" rtlCol="0" anchor="b" anchorCtr="0">
+            <a:normAutofit/>
           </a:bodyPr>
           <a:lstStyle/>
           <a:p>
             <a:pPr algn="ctr"/>
             <a:r>
-              <a:rPr lang="en-US" sz="3600" spc="-100" dirty="0"/>
+              <a:rPr lang="en-US" sz="5600" spc="-100"/>
               <a:t>Results and Discussion</a:t>
             </a:r>
           </a:p>
@@ -26491,10 +26492,10 @@
       </p:sp>
       <p:grpSp>
         <p:nvGrpSpPr>
-          <p:cNvPr id="15" name="Group 14">
+          <p:cNvPr id="36" name="Group 35">
             <a:extLst>
               <a:ext uri="{FF2B5EF4-FFF2-40B4-BE49-F238E27FC236}">
-                <a16:creationId xmlns:a16="http://schemas.microsoft.com/office/drawing/2014/main" id="{C8F3AECA-1E28-4DB0-901D-747B827596E9}"/>
+                <a16:creationId xmlns:a16="http://schemas.microsoft.com/office/drawing/2014/main" id="{F2FD01A0-E6FF-41CD-AEBD-279232B90D43}"/>
               </a:ext>
               <a:ext uri="{C183D7F6-B498-43B3-948B-1728B52AA6E4}">
                 <adec:decorative xmlns:adec="http://schemas.microsoft.com/office/drawing/2017/decorative" val="1"/>
@@ -26514,18 +26515,1718 @@
         </p:nvGrpSpPr>
         <p:grpSpPr>
           <a:xfrm>
-            <a:off x="389400" y="406270"/>
-            <a:ext cx="684878" cy="1449344"/>
-            <a:chOff x="643527" y="1187494"/>
-            <a:chExt cx="1434178" cy="3035022"/>
+            <a:off x="1965602" y="317452"/>
+            <a:ext cx="2088038" cy="719230"/>
+            <a:chOff x="4532666" y="505937"/>
+            <a:chExt cx="2981730" cy="1027064"/>
           </a:xfrm>
         </p:grpSpPr>
         <p:sp>
           <p:nvSpPr>
-            <p:cNvPr id="16" name="Freeform 78">
+            <p:cNvPr id="37" name="Freeform 78">
               <a:extLst>
                 <a:ext uri="{FF2B5EF4-FFF2-40B4-BE49-F238E27FC236}">
-                  <a16:creationId xmlns:a16="http://schemas.microsoft.com/office/drawing/2014/main" id="{F137E6B0-A1AA-47FF-AAB8-9E5D6B701C04}"/>
+                  <a16:creationId xmlns:a16="http://schemas.microsoft.com/office/drawing/2014/main" id="{811C6308-5554-4129-8881-A95AF512C52C}"/>
+                </a:ext>
+                <a:ext uri="{C183D7F6-B498-43B3-948B-1728B52AA6E4}">
+                  <adec:decorative xmlns:adec="http://schemas.microsoft.com/office/drawing/2017/decorative" val="1"/>
+                </a:ext>
+              </a:extLst>
+            </p:cNvPr>
+            <p:cNvSpPr>
+              <a:spLocks/>
+            </p:cNvSpPr>
+            <p:nvPr>
+              <p:extLst>
+                <p:ext uri="{386F3935-93C4-4BCD-93E2-E3B085C9AB24}">
+                  <p16:designElem xmlns:p16="http://schemas.microsoft.com/office/powerpoint/2015/main" val="1"/>
+                </p:ext>
+              </p:extLst>
+            </p:nvPr>
+          </p:nvSpPr>
+          <p:spPr bwMode="auto">
+            <a:xfrm rot="600114">
+              <a:off x="4532666" y="754398"/>
+              <a:ext cx="694205" cy="713383"/>
+            </a:xfrm>
+            <a:custGeom>
+              <a:avLst/>
+              <a:gdLst>
+                <a:gd name="T0" fmla="*/ 32 w 58"/>
+                <a:gd name="T1" fmla="*/ 56 h 60"/>
+                <a:gd name="T2" fmla="*/ 24 w 58"/>
+                <a:gd name="T3" fmla="*/ 48 h 60"/>
+                <a:gd name="T4" fmla="*/ 14 w 58"/>
+                <a:gd name="T5" fmla="*/ 36 h 60"/>
+                <a:gd name="T6" fmla="*/ 7 w 58"/>
+                <a:gd name="T7" fmla="*/ 29 h 60"/>
+                <a:gd name="T8" fmla="*/ 1 w 58"/>
+                <a:gd name="T9" fmla="*/ 17 h 60"/>
+                <a:gd name="T10" fmla="*/ 7 w 58"/>
+                <a:gd name="T11" fmla="*/ 4 h 60"/>
+                <a:gd name="T12" fmla="*/ 17 w 58"/>
+                <a:gd name="T13" fmla="*/ 1 h 60"/>
+                <a:gd name="T14" fmla="*/ 29 w 58"/>
+                <a:gd name="T15" fmla="*/ 6 h 60"/>
+                <a:gd name="T16" fmla="*/ 31 w 58"/>
+                <a:gd name="T17" fmla="*/ 8 h 60"/>
+                <a:gd name="T18" fmla="*/ 38 w 58"/>
+                <a:gd name="T19" fmla="*/ 15 h 60"/>
+                <a:gd name="T20" fmla="*/ 44 w 58"/>
+                <a:gd name="T21" fmla="*/ 22 h 60"/>
+                <a:gd name="T22" fmla="*/ 54 w 58"/>
+                <a:gd name="T23" fmla="*/ 33 h 60"/>
+                <a:gd name="T24" fmla="*/ 58 w 58"/>
+                <a:gd name="T25" fmla="*/ 44 h 60"/>
+                <a:gd name="T26" fmla="*/ 53 w 58"/>
+                <a:gd name="T27" fmla="*/ 54 h 60"/>
+                <a:gd name="T28" fmla="*/ 42 w 58"/>
+                <a:gd name="T29" fmla="*/ 60 h 60"/>
+                <a:gd name="T30" fmla="*/ 32 w 58"/>
+                <a:gd name="T31" fmla="*/ 56 h 60"/>
+              </a:gdLst>
+              <a:ahLst/>
+              <a:cxnLst>
+                <a:cxn ang="0">
+                  <a:pos x="T0" y="T1"/>
+                </a:cxn>
+                <a:cxn ang="0">
+                  <a:pos x="T2" y="T3"/>
+                </a:cxn>
+                <a:cxn ang="0">
+                  <a:pos x="T4" y="T5"/>
+                </a:cxn>
+                <a:cxn ang="0">
+                  <a:pos x="T6" y="T7"/>
+                </a:cxn>
+                <a:cxn ang="0">
+                  <a:pos x="T8" y="T9"/>
+                </a:cxn>
+                <a:cxn ang="0">
+                  <a:pos x="T10" y="T11"/>
+                </a:cxn>
+                <a:cxn ang="0">
+                  <a:pos x="T12" y="T13"/>
+                </a:cxn>
+                <a:cxn ang="0">
+                  <a:pos x="T14" y="T15"/>
+                </a:cxn>
+                <a:cxn ang="0">
+                  <a:pos x="T16" y="T17"/>
+                </a:cxn>
+                <a:cxn ang="0">
+                  <a:pos x="T18" y="T19"/>
+                </a:cxn>
+                <a:cxn ang="0">
+                  <a:pos x="T20" y="T21"/>
+                </a:cxn>
+                <a:cxn ang="0">
+                  <a:pos x="T22" y="T23"/>
+                </a:cxn>
+                <a:cxn ang="0">
+                  <a:pos x="T24" y="T25"/>
+                </a:cxn>
+                <a:cxn ang="0">
+                  <a:pos x="T26" y="T27"/>
+                </a:cxn>
+                <a:cxn ang="0">
+                  <a:pos x="T28" y="T29"/>
+                </a:cxn>
+                <a:cxn ang="0">
+                  <a:pos x="T30" y="T31"/>
+                </a:cxn>
+              </a:cxnLst>
+              <a:rect l="0" t="0" r="r" b="b"/>
+              <a:pathLst>
+                <a:path w="58" h="60">
+                  <a:moveTo>
+                    <a:pt x="32" y="56"/>
+                  </a:moveTo>
+                  <a:cubicBezTo>
+                    <a:pt x="30" y="54"/>
+                    <a:pt x="31" y="55"/>
+                    <a:pt x="24" y="48"/>
+                  </a:cubicBezTo>
+                  <a:cubicBezTo>
+                    <a:pt x="17" y="40"/>
+                    <a:pt x="14" y="36"/>
+                    <a:pt x="14" y="36"/>
+                  </a:cubicBezTo>
+                  <a:cubicBezTo>
+                    <a:pt x="8" y="30"/>
+                    <a:pt x="14" y="37"/>
+                    <a:pt x="7" y="29"/>
+                  </a:cubicBezTo>
+                  <a:cubicBezTo>
+                    <a:pt x="3" y="24"/>
+                    <a:pt x="1" y="20"/>
+                    <a:pt x="1" y="17"/>
+                  </a:cubicBezTo>
+                  <a:cubicBezTo>
+                    <a:pt x="0" y="13"/>
+                    <a:pt x="3" y="9"/>
+                    <a:pt x="7" y="4"/>
+                  </a:cubicBezTo>
+                  <a:cubicBezTo>
+                    <a:pt x="10" y="2"/>
+                    <a:pt x="13" y="0"/>
+                    <a:pt x="17" y="1"/>
+                  </a:cubicBezTo>
+                  <a:cubicBezTo>
+                    <a:pt x="21" y="1"/>
+                    <a:pt x="25" y="3"/>
+                    <a:pt x="29" y="6"/>
+                  </a:cubicBezTo>
+                  <a:cubicBezTo>
+                    <a:pt x="31" y="8"/>
+                    <a:pt x="31" y="8"/>
+                    <a:pt x="31" y="8"/>
+                  </a:cubicBezTo>
+                  <a:cubicBezTo>
+                    <a:pt x="33" y="11"/>
+                    <a:pt x="37" y="15"/>
+                    <a:pt x="38" y="15"/>
+                  </a:cubicBezTo>
+                  <a:cubicBezTo>
+                    <a:pt x="42" y="20"/>
+                    <a:pt x="40" y="18"/>
+                    <a:pt x="44" y="22"/>
+                  </a:cubicBezTo>
+                  <a:cubicBezTo>
+                    <a:pt x="51" y="29"/>
+                    <a:pt x="50" y="29"/>
+                    <a:pt x="54" y="33"/>
+                  </a:cubicBezTo>
+                  <a:cubicBezTo>
+                    <a:pt x="57" y="37"/>
+                    <a:pt x="58" y="40"/>
+                    <a:pt x="58" y="44"/>
+                  </a:cubicBezTo>
+                  <a:cubicBezTo>
+                    <a:pt x="58" y="47"/>
+                    <a:pt x="56" y="50"/>
+                    <a:pt x="53" y="54"/>
+                  </a:cubicBezTo>
+                  <a:cubicBezTo>
+                    <a:pt x="49" y="58"/>
+                    <a:pt x="45" y="60"/>
+                    <a:pt x="42" y="60"/>
+                  </a:cubicBezTo>
+                  <a:cubicBezTo>
+                    <a:pt x="39" y="60"/>
+                    <a:pt x="36" y="59"/>
+                    <a:pt x="32" y="56"/>
+                  </a:cubicBezTo>
+                  <a:close/>
+                </a:path>
+              </a:pathLst>
+            </a:custGeom>
+            <a:solidFill>
+              <a:schemeClr val="accent2"/>
+            </a:solidFill>
+            <a:ln>
+              <a:noFill/>
+            </a:ln>
+          </p:spPr>
+          <p:txBody>
+            <a:bodyPr vert="horz" wrap="square" lIns="91440" tIns="45720" rIns="91440" bIns="45720" numCol="1" anchor="t" anchorCtr="0" compatLnSpc="1">
+              <a:prstTxWarp prst="textNoShape">
+                <a:avLst/>
+              </a:prstTxWarp>
+            </a:bodyPr>
+            <a:lstStyle/>
+            <a:p>
+              <a:endParaRPr lang="en-US">
+                <a:solidFill>
+                  <a:schemeClr val="accent3"/>
+                </a:solidFill>
+              </a:endParaRPr>
+            </a:p>
+          </p:txBody>
+        </p:sp>
+        <p:sp>
+          <p:nvSpPr>
+            <p:cNvPr id="38" name="Freeform 79">
+              <a:extLst>
+                <a:ext uri="{FF2B5EF4-FFF2-40B4-BE49-F238E27FC236}">
+                  <a16:creationId xmlns:a16="http://schemas.microsoft.com/office/drawing/2014/main" id="{C28F3A03-B53B-433E-8DF7-6B13336D0A53}"/>
+                </a:ext>
+                <a:ext uri="{C183D7F6-B498-43B3-948B-1728B52AA6E4}">
+                  <adec:decorative xmlns:adec="http://schemas.microsoft.com/office/drawing/2017/decorative" val="1"/>
+                </a:ext>
+              </a:extLst>
+            </p:cNvPr>
+            <p:cNvSpPr>
+              <a:spLocks/>
+            </p:cNvSpPr>
+            <p:nvPr>
+              <p:extLst>
+                <p:ext uri="{386F3935-93C4-4BCD-93E2-E3B085C9AB24}">
+                  <p16:designElem xmlns:p16="http://schemas.microsoft.com/office/powerpoint/2015/main" val="1"/>
+                </p:ext>
+              </p:extLst>
+            </p:nvPr>
+          </p:nvSpPr>
+          <p:spPr bwMode="auto">
+            <a:xfrm rot="600114">
+              <a:off x="5791465" y="505937"/>
+              <a:ext cx="587404" cy="943792"/>
+            </a:xfrm>
+            <a:custGeom>
+              <a:avLst/>
+              <a:gdLst>
+                <a:gd name="T0" fmla="*/ 15 w 49"/>
+                <a:gd name="T1" fmla="*/ 65 h 79"/>
+                <a:gd name="T2" fmla="*/ 12 w 49"/>
+                <a:gd name="T3" fmla="*/ 54 h 79"/>
+                <a:gd name="T4" fmla="*/ 8 w 49"/>
+                <a:gd name="T5" fmla="*/ 33 h 79"/>
+                <a:gd name="T6" fmla="*/ 38 w 49"/>
+                <a:gd name="T7" fmla="*/ 24 h 79"/>
+                <a:gd name="T8" fmla="*/ 45 w 49"/>
+                <a:gd name="T9" fmla="*/ 70 h 79"/>
+                <a:gd name="T10" fmla="*/ 15 w 49"/>
+                <a:gd name="T11" fmla="*/ 65 h 79"/>
+              </a:gdLst>
+              <a:ahLst/>
+              <a:cxnLst>
+                <a:cxn ang="0">
+                  <a:pos x="T0" y="T1"/>
+                </a:cxn>
+                <a:cxn ang="0">
+                  <a:pos x="T2" y="T3"/>
+                </a:cxn>
+                <a:cxn ang="0">
+                  <a:pos x="T4" y="T5"/>
+                </a:cxn>
+                <a:cxn ang="0">
+                  <a:pos x="T6" y="T7"/>
+                </a:cxn>
+                <a:cxn ang="0">
+                  <a:pos x="T8" y="T9"/>
+                </a:cxn>
+                <a:cxn ang="0">
+                  <a:pos x="T10" y="T11"/>
+                </a:cxn>
+              </a:cxnLst>
+              <a:rect l="0" t="0" r="r" b="b"/>
+              <a:pathLst>
+                <a:path w="49" h="79">
+                  <a:moveTo>
+                    <a:pt x="15" y="65"/>
+                  </a:moveTo>
+                  <a:cubicBezTo>
+                    <a:pt x="14" y="59"/>
+                    <a:pt x="13" y="58"/>
+                    <a:pt x="12" y="54"/>
+                  </a:cubicBezTo>
+                  <a:cubicBezTo>
+                    <a:pt x="11" y="45"/>
+                    <a:pt x="10" y="40"/>
+                    <a:pt x="8" y="33"/>
+                  </a:cubicBezTo>
+                  <a:cubicBezTo>
+                    <a:pt x="0" y="9"/>
+                    <a:pt x="34" y="0"/>
+                    <a:pt x="38" y="24"/>
+                  </a:cubicBezTo>
+                  <a:cubicBezTo>
+                    <a:pt x="43" y="43"/>
+                    <a:pt x="49" y="60"/>
+                    <a:pt x="45" y="70"/>
+                  </a:cubicBezTo>
+                  <a:cubicBezTo>
+                    <a:pt x="38" y="77"/>
+                    <a:pt x="19" y="79"/>
+                    <a:pt x="15" y="65"/>
+                  </a:cubicBezTo>
+                  <a:close/>
+                </a:path>
+              </a:pathLst>
+            </a:custGeom>
+            <a:solidFill>
+              <a:schemeClr val="accent2"/>
+            </a:solidFill>
+            <a:ln>
+              <a:noFill/>
+            </a:ln>
+          </p:spPr>
+          <p:txBody>
+            <a:bodyPr vert="horz" wrap="square" lIns="91440" tIns="45720" rIns="91440" bIns="45720" numCol="1" anchor="t" anchorCtr="0" compatLnSpc="1">
+              <a:prstTxWarp prst="textNoShape">
+                <a:avLst/>
+              </a:prstTxWarp>
+            </a:bodyPr>
+            <a:lstStyle/>
+            <a:p>
+              <a:endParaRPr lang="en-US">
+                <a:solidFill>
+                  <a:schemeClr val="accent3"/>
+                </a:solidFill>
+              </a:endParaRPr>
+            </a:p>
+          </p:txBody>
+        </p:sp>
+        <p:sp>
+          <p:nvSpPr>
+            <p:cNvPr id="39" name="Freeform 85">
+              <a:extLst>
+                <a:ext uri="{FF2B5EF4-FFF2-40B4-BE49-F238E27FC236}">
+                  <a16:creationId xmlns:a16="http://schemas.microsoft.com/office/drawing/2014/main" id="{E990BBBC-E616-4D0E-9917-A6CA72AAEA42}"/>
+                </a:ext>
+                <a:ext uri="{C183D7F6-B498-43B3-948B-1728B52AA6E4}">
+                  <adec:decorative xmlns:adec="http://schemas.microsoft.com/office/drawing/2017/decorative" val="1"/>
+                </a:ext>
+              </a:extLst>
+            </p:cNvPr>
+            <p:cNvSpPr>
+              <a:spLocks/>
+            </p:cNvSpPr>
+            <p:nvPr>
+              <p:extLst>
+                <p:ext uri="{386F3935-93C4-4BCD-93E2-E3B085C9AB24}">
+                  <p16:designElem xmlns:p16="http://schemas.microsoft.com/office/powerpoint/2015/main" val="1"/>
+                </p:ext>
+              </p:extLst>
+            </p:nvPr>
+          </p:nvSpPr>
+          <p:spPr bwMode="auto">
+            <a:xfrm rot="600114">
+              <a:off x="7087193" y="757585"/>
+              <a:ext cx="427203" cy="775416"/>
+            </a:xfrm>
+            <a:custGeom>
+              <a:avLst/>
+              <a:gdLst>
+                <a:gd name="T0" fmla="*/ 36 w 36"/>
+                <a:gd name="T1" fmla="*/ 15 h 65"/>
+                <a:gd name="T2" fmla="*/ 34 w 36"/>
+                <a:gd name="T3" fmla="*/ 5 h 65"/>
+                <a:gd name="T4" fmla="*/ 28 w 36"/>
+                <a:gd name="T5" fmla="*/ 1 h 65"/>
+                <a:gd name="T6" fmla="*/ 23 w 36"/>
+                <a:gd name="T7" fmla="*/ 0 h 65"/>
+                <a:gd name="T8" fmla="*/ 13 w 36"/>
+                <a:gd name="T9" fmla="*/ 1 h 65"/>
+                <a:gd name="T10" fmla="*/ 7 w 36"/>
+                <a:gd name="T11" fmla="*/ 9 h 65"/>
+                <a:gd name="T12" fmla="*/ 4 w 36"/>
+                <a:gd name="T13" fmla="*/ 19 h 65"/>
+                <a:gd name="T14" fmla="*/ 0 w 36"/>
+                <a:gd name="T15" fmla="*/ 44 h 65"/>
+                <a:gd name="T16" fmla="*/ 1 w 36"/>
+                <a:gd name="T17" fmla="*/ 58 h 65"/>
+                <a:gd name="T18" fmla="*/ 8 w 36"/>
+                <a:gd name="T19" fmla="*/ 64 h 65"/>
+                <a:gd name="T20" fmla="*/ 16 w 36"/>
+                <a:gd name="T21" fmla="*/ 65 h 65"/>
+                <a:gd name="T22" fmla="*/ 25 w 36"/>
+                <a:gd name="T23" fmla="*/ 63 h 65"/>
+                <a:gd name="T24" fmla="*/ 31 w 36"/>
+                <a:gd name="T25" fmla="*/ 55 h 65"/>
+                <a:gd name="T26" fmla="*/ 34 w 36"/>
+                <a:gd name="T27" fmla="*/ 40 h 65"/>
+                <a:gd name="T28" fmla="*/ 36 w 36"/>
+                <a:gd name="T29" fmla="*/ 15 h 65"/>
+              </a:gdLst>
+              <a:ahLst/>
+              <a:cxnLst>
+                <a:cxn ang="0">
+                  <a:pos x="T0" y="T1"/>
+                </a:cxn>
+                <a:cxn ang="0">
+                  <a:pos x="T2" y="T3"/>
+                </a:cxn>
+                <a:cxn ang="0">
+                  <a:pos x="T4" y="T5"/>
+                </a:cxn>
+                <a:cxn ang="0">
+                  <a:pos x="T6" y="T7"/>
+                </a:cxn>
+                <a:cxn ang="0">
+                  <a:pos x="T8" y="T9"/>
+                </a:cxn>
+                <a:cxn ang="0">
+                  <a:pos x="T10" y="T11"/>
+                </a:cxn>
+                <a:cxn ang="0">
+                  <a:pos x="T12" y="T13"/>
+                </a:cxn>
+                <a:cxn ang="0">
+                  <a:pos x="T14" y="T15"/>
+                </a:cxn>
+                <a:cxn ang="0">
+                  <a:pos x="T16" y="T17"/>
+                </a:cxn>
+                <a:cxn ang="0">
+                  <a:pos x="T18" y="T19"/>
+                </a:cxn>
+                <a:cxn ang="0">
+                  <a:pos x="T20" y="T21"/>
+                </a:cxn>
+                <a:cxn ang="0">
+                  <a:pos x="T22" y="T23"/>
+                </a:cxn>
+                <a:cxn ang="0">
+                  <a:pos x="T24" y="T25"/>
+                </a:cxn>
+                <a:cxn ang="0">
+                  <a:pos x="T26" y="T27"/>
+                </a:cxn>
+                <a:cxn ang="0">
+                  <a:pos x="T28" y="T29"/>
+                </a:cxn>
+              </a:cxnLst>
+              <a:rect l="0" t="0" r="r" b="b"/>
+              <a:pathLst>
+                <a:path w="36" h="65">
+                  <a:moveTo>
+                    <a:pt x="36" y="15"/>
+                  </a:moveTo>
+                  <a:cubicBezTo>
+                    <a:pt x="36" y="10"/>
+                    <a:pt x="35" y="7"/>
+                    <a:pt x="34" y="5"/>
+                  </a:cubicBezTo>
+                  <a:cubicBezTo>
+                    <a:pt x="33" y="3"/>
+                    <a:pt x="31" y="2"/>
+                    <a:pt x="28" y="1"/>
+                  </a:cubicBezTo>
+                  <a:cubicBezTo>
+                    <a:pt x="27" y="1"/>
+                    <a:pt x="25" y="1"/>
+                    <a:pt x="23" y="0"/>
+                  </a:cubicBezTo>
+                  <a:cubicBezTo>
+                    <a:pt x="19" y="0"/>
+                    <a:pt x="16" y="0"/>
+                    <a:pt x="13" y="1"/>
+                  </a:cubicBezTo>
+                  <a:cubicBezTo>
+                    <a:pt x="11" y="2"/>
+                    <a:pt x="9" y="4"/>
+                    <a:pt x="7" y="9"/>
+                  </a:cubicBezTo>
+                  <a:cubicBezTo>
+                    <a:pt x="6" y="13"/>
+                    <a:pt x="5" y="17"/>
+                    <a:pt x="4" y="19"/>
+                  </a:cubicBezTo>
+                  <a:cubicBezTo>
+                    <a:pt x="2" y="29"/>
+                    <a:pt x="0" y="44"/>
+                    <a:pt x="0" y="44"/>
+                  </a:cubicBezTo>
+                  <a:cubicBezTo>
+                    <a:pt x="0" y="50"/>
+                    <a:pt x="0" y="55"/>
+                    <a:pt x="1" y="58"/>
+                  </a:cubicBezTo>
+                  <a:cubicBezTo>
+                    <a:pt x="2" y="61"/>
+                    <a:pt x="5" y="63"/>
+                    <a:pt x="8" y="64"/>
+                  </a:cubicBezTo>
+                  <a:cubicBezTo>
+                    <a:pt x="11" y="65"/>
+                    <a:pt x="13" y="65"/>
+                    <a:pt x="16" y="65"/>
+                  </a:cubicBezTo>
+                  <a:cubicBezTo>
+                    <a:pt x="19" y="65"/>
+                    <a:pt x="22" y="64"/>
+                    <a:pt x="25" y="63"/>
+                  </a:cubicBezTo>
+                  <a:cubicBezTo>
+                    <a:pt x="28" y="61"/>
+                    <a:pt x="30" y="59"/>
+                    <a:pt x="31" y="55"/>
+                  </a:cubicBezTo>
+                  <a:cubicBezTo>
+                    <a:pt x="32" y="50"/>
+                    <a:pt x="31" y="54"/>
+                    <a:pt x="34" y="40"/>
+                  </a:cubicBezTo>
+                  <a:lnTo>
+                    <a:pt x="36" y="15"/>
+                  </a:lnTo>
+                  <a:close/>
+                </a:path>
+              </a:pathLst>
+            </a:custGeom>
+            <a:solidFill>
+              <a:schemeClr val="accent2"/>
+            </a:solidFill>
+            <a:ln>
+              <a:noFill/>
+            </a:ln>
+          </p:spPr>
+          <p:txBody>
+            <a:bodyPr vert="horz" wrap="square" lIns="91440" tIns="45720" rIns="91440" bIns="45720" numCol="1" anchor="t" anchorCtr="0" compatLnSpc="1">
+              <a:prstTxWarp prst="textNoShape">
+                <a:avLst/>
+              </a:prstTxWarp>
+            </a:bodyPr>
+            <a:lstStyle/>
+            <a:p>
+              <a:endParaRPr lang="en-US">
+                <a:solidFill>
+                  <a:schemeClr val="accent3"/>
+                </a:solidFill>
+              </a:endParaRPr>
+            </a:p>
+          </p:txBody>
+        </p:sp>
+      </p:grpSp>
+      <p:pic>
+        <p:nvPicPr>
+          <p:cNvPr id="5" name="Picture 4">
+            <a:extLst>
+              <a:ext uri="{FF2B5EF4-FFF2-40B4-BE49-F238E27FC236}">
+                <a16:creationId xmlns:a16="http://schemas.microsoft.com/office/drawing/2014/main" id="{860EEE48-F0D3-2F43-A56A-BC7ACB836650}"/>
+              </a:ext>
+            </a:extLst>
+          </p:cNvPr>
+          <p:cNvPicPr>
+            <a:picLocks noChangeAspect="1"/>
+          </p:cNvPicPr>
+          <p:nvPr/>
+        </p:nvPicPr>
+        <p:blipFill rotWithShape="1">
+          <a:blip r:embed="rId2"/>
+          <a:srcRect r="2243" b="2"/>
+          <a:stretch/>
+        </p:blipFill>
+        <p:spPr>
+          <a:xfrm>
+            <a:off x="6329918" y="3337210"/>
+            <a:ext cx="5903725" cy="3427190"/>
+          </a:xfrm>
+          <a:custGeom>
+            <a:avLst/>
+            <a:gdLst/>
+            <a:ahLst/>
+            <a:cxnLst/>
+            <a:rect l="l" t="t" r="r" b="b"/>
+            <a:pathLst>
+              <a:path w="5903725" h="3427200">
+                <a:moveTo>
+                  <a:pt x="17547" y="0"/>
+                </a:moveTo>
+                <a:lnTo>
+                  <a:pt x="5903725" y="0"/>
+                </a:lnTo>
+                <a:lnTo>
+                  <a:pt x="5903725" y="3427200"/>
+                </a:lnTo>
+                <a:lnTo>
+                  <a:pt x="41642" y="3427200"/>
+                </a:lnTo>
+                <a:lnTo>
+                  <a:pt x="34002" y="3033799"/>
+                </a:lnTo>
+                <a:cubicBezTo>
+                  <a:pt x="8141" y="1703374"/>
+                  <a:pt x="-15687" y="415221"/>
+                  <a:pt x="13203" y="42009"/>
+                </a:cubicBezTo>
+                <a:close/>
+              </a:path>
+            </a:pathLst>
+          </a:custGeom>
+        </p:spPr>
+      </p:pic>
+      <p:grpSp>
+        <p:nvGrpSpPr>
+          <p:cNvPr id="41" name="Group 40">
+            <a:extLst>
+              <a:ext uri="{FF2B5EF4-FFF2-40B4-BE49-F238E27FC236}">
+                <a16:creationId xmlns:a16="http://schemas.microsoft.com/office/drawing/2014/main" id="{3C9AA14C-80A4-427C-A911-28CD20C56E5E}"/>
+              </a:ext>
+              <a:ext uri="{C183D7F6-B498-43B3-948B-1728B52AA6E4}">
+                <adec:decorative xmlns:adec="http://schemas.microsoft.com/office/drawing/2017/decorative" val="1"/>
+              </a:ext>
+            </a:extLst>
+          </p:cNvPr>
+          <p:cNvGrpSpPr>
+            <a:grpSpLocks noGrp="1" noUngrp="1" noRot="1" noChangeAspect="1" noMove="1" noResize="1"/>
+          </p:cNvGrpSpPr>
+          <p:nvPr>
+            <p:extLst>
+              <p:ext uri="{386F3935-93C4-4BCD-93E2-E3B085C9AB24}">
+                <p16:designElem xmlns:p16="http://schemas.microsoft.com/office/powerpoint/2015/main" val="1"/>
+              </p:ext>
+            </p:extLst>
+          </p:nvPr>
+        </p:nvGrpSpPr>
+        <p:grpSpPr>
+          <a:xfrm>
+            <a:off x="2017356" y="5503147"/>
+            <a:ext cx="2117174" cy="588806"/>
+            <a:chOff x="4549904" y="5078157"/>
+            <a:chExt cx="3023338" cy="840818"/>
+          </a:xfrm>
+        </p:grpSpPr>
+        <p:sp>
+          <p:nvSpPr>
+            <p:cNvPr id="42" name="Freeform 80">
+              <a:extLst>
+                <a:ext uri="{FF2B5EF4-FFF2-40B4-BE49-F238E27FC236}">
+                  <a16:creationId xmlns:a16="http://schemas.microsoft.com/office/drawing/2014/main" id="{EF32CDAF-4619-4949-9516-1E042181EBF3}"/>
+                </a:ext>
+                <a:ext uri="{C183D7F6-B498-43B3-948B-1728B52AA6E4}">
+                  <adec:decorative xmlns:adec="http://schemas.microsoft.com/office/drawing/2017/decorative" val="1"/>
+                </a:ext>
+              </a:extLst>
+            </p:cNvPr>
+            <p:cNvSpPr>
+              <a:spLocks/>
+            </p:cNvSpPr>
+            <p:nvPr>
+              <p:extLst>
+                <p:ext uri="{386F3935-93C4-4BCD-93E2-E3B085C9AB24}">
+                  <p16:designElem xmlns:p16="http://schemas.microsoft.com/office/powerpoint/2015/main" val="1"/>
+                </p:ext>
+              </p:extLst>
+            </p:nvPr>
+          </p:nvSpPr>
+          <p:spPr bwMode="auto">
+            <a:xfrm rot="5400000">
+              <a:off x="5690691" y="5352589"/>
+              <a:ext cx="749228" cy="383544"/>
+            </a:xfrm>
+            <a:custGeom>
+              <a:avLst/>
+              <a:gdLst>
+                <a:gd name="T0" fmla="*/ 53 w 66"/>
+                <a:gd name="T1" fmla="*/ 33 h 34"/>
+                <a:gd name="T2" fmla="*/ 39 w 66"/>
+                <a:gd name="T3" fmla="*/ 33 h 34"/>
+                <a:gd name="T4" fmla="*/ 21 w 66"/>
+                <a:gd name="T5" fmla="*/ 33 h 34"/>
+                <a:gd name="T6" fmla="*/ 12 w 66"/>
+                <a:gd name="T7" fmla="*/ 32 h 34"/>
+                <a:gd name="T8" fmla="*/ 3 w 66"/>
+                <a:gd name="T9" fmla="*/ 28 h 34"/>
+                <a:gd name="T10" fmla="*/ 0 w 66"/>
+                <a:gd name="T11" fmla="*/ 21 h 34"/>
+                <a:gd name="T12" fmla="*/ 0 w 66"/>
+                <a:gd name="T13" fmla="*/ 16 h 34"/>
+                <a:gd name="T14" fmla="*/ 3 w 66"/>
+                <a:gd name="T15" fmla="*/ 7 h 34"/>
+                <a:gd name="T16" fmla="*/ 11 w 66"/>
+                <a:gd name="T17" fmla="*/ 3 h 34"/>
+                <a:gd name="T18" fmla="*/ 23 w 66"/>
+                <a:gd name="T19" fmla="*/ 2 h 34"/>
+                <a:gd name="T20" fmla="*/ 43 w 66"/>
+                <a:gd name="T21" fmla="*/ 0 h 34"/>
+                <a:gd name="T22" fmla="*/ 48 w 66"/>
+                <a:gd name="T23" fmla="*/ 0 h 34"/>
+                <a:gd name="T24" fmla="*/ 62 w 66"/>
+                <a:gd name="T25" fmla="*/ 4 h 34"/>
+                <a:gd name="T26" fmla="*/ 66 w 66"/>
+                <a:gd name="T27" fmla="*/ 13 h 34"/>
+                <a:gd name="T28" fmla="*/ 66 w 66"/>
+                <a:gd name="T29" fmla="*/ 20 h 34"/>
+                <a:gd name="T30" fmla="*/ 62 w 66"/>
+                <a:gd name="T31" fmla="*/ 29 h 34"/>
+                <a:gd name="T32" fmla="*/ 53 w 66"/>
+                <a:gd name="T33" fmla="*/ 33 h 34"/>
+              </a:gdLst>
+              <a:ahLst/>
+              <a:cxnLst>
+                <a:cxn ang="0">
+                  <a:pos x="T0" y="T1"/>
+                </a:cxn>
+                <a:cxn ang="0">
+                  <a:pos x="T2" y="T3"/>
+                </a:cxn>
+                <a:cxn ang="0">
+                  <a:pos x="T4" y="T5"/>
+                </a:cxn>
+                <a:cxn ang="0">
+                  <a:pos x="T6" y="T7"/>
+                </a:cxn>
+                <a:cxn ang="0">
+                  <a:pos x="T8" y="T9"/>
+                </a:cxn>
+                <a:cxn ang="0">
+                  <a:pos x="T10" y="T11"/>
+                </a:cxn>
+                <a:cxn ang="0">
+                  <a:pos x="T12" y="T13"/>
+                </a:cxn>
+                <a:cxn ang="0">
+                  <a:pos x="T14" y="T15"/>
+                </a:cxn>
+                <a:cxn ang="0">
+                  <a:pos x="T16" y="T17"/>
+                </a:cxn>
+                <a:cxn ang="0">
+                  <a:pos x="T18" y="T19"/>
+                </a:cxn>
+                <a:cxn ang="0">
+                  <a:pos x="T20" y="T21"/>
+                </a:cxn>
+                <a:cxn ang="0">
+                  <a:pos x="T22" y="T23"/>
+                </a:cxn>
+                <a:cxn ang="0">
+                  <a:pos x="T24" y="T25"/>
+                </a:cxn>
+                <a:cxn ang="0">
+                  <a:pos x="T26" y="T27"/>
+                </a:cxn>
+                <a:cxn ang="0">
+                  <a:pos x="T28" y="T29"/>
+                </a:cxn>
+                <a:cxn ang="0">
+                  <a:pos x="T30" y="T31"/>
+                </a:cxn>
+                <a:cxn ang="0">
+                  <a:pos x="T32" y="T33"/>
+                </a:cxn>
+              </a:cxnLst>
+              <a:rect l="0" t="0" r="r" b="b"/>
+              <a:pathLst>
+                <a:path w="66" h="34">
+                  <a:moveTo>
+                    <a:pt x="53" y="33"/>
+                  </a:moveTo>
+                  <a:cubicBezTo>
+                    <a:pt x="47" y="33"/>
+                    <a:pt x="53" y="34"/>
+                    <a:pt x="39" y="33"/>
+                  </a:cubicBezTo>
+                  <a:cubicBezTo>
+                    <a:pt x="24" y="33"/>
+                    <a:pt x="21" y="33"/>
+                    <a:pt x="21" y="33"/>
+                  </a:cubicBezTo>
+                  <a:cubicBezTo>
+                    <a:pt x="12" y="32"/>
+                    <a:pt x="12" y="32"/>
+                    <a:pt x="12" y="32"/>
+                  </a:cubicBezTo>
+                  <a:cubicBezTo>
+                    <a:pt x="7" y="31"/>
+                    <a:pt x="4" y="30"/>
+                    <a:pt x="3" y="28"/>
+                  </a:cubicBezTo>
+                  <a:cubicBezTo>
+                    <a:pt x="1" y="26"/>
+                    <a:pt x="0" y="24"/>
+                    <a:pt x="0" y="21"/>
+                  </a:cubicBezTo>
+                  <a:cubicBezTo>
+                    <a:pt x="0" y="21"/>
+                    <a:pt x="0" y="19"/>
+                    <a:pt x="0" y="16"/>
+                  </a:cubicBezTo>
+                  <a:cubicBezTo>
+                    <a:pt x="0" y="13"/>
+                    <a:pt x="1" y="10"/>
+                    <a:pt x="3" y="7"/>
+                  </a:cubicBezTo>
+                  <a:cubicBezTo>
+                    <a:pt x="4" y="5"/>
+                    <a:pt x="7" y="3"/>
+                    <a:pt x="11" y="3"/>
+                  </a:cubicBezTo>
+                  <a:cubicBezTo>
+                    <a:pt x="16" y="2"/>
+                    <a:pt x="20" y="2"/>
+                    <a:pt x="23" y="2"/>
+                  </a:cubicBezTo>
+                  <a:cubicBezTo>
+                    <a:pt x="32" y="1"/>
+                    <a:pt x="37" y="0"/>
+                    <a:pt x="43" y="0"/>
+                  </a:cubicBezTo>
+                  <a:cubicBezTo>
+                    <a:pt x="48" y="0"/>
+                    <a:pt x="48" y="0"/>
+                    <a:pt x="48" y="0"/>
+                  </a:cubicBezTo>
+                  <a:cubicBezTo>
+                    <a:pt x="54" y="1"/>
+                    <a:pt x="59" y="3"/>
+                    <a:pt x="62" y="4"/>
+                  </a:cubicBezTo>
+                  <a:cubicBezTo>
+                    <a:pt x="65" y="6"/>
+                    <a:pt x="66" y="9"/>
+                    <a:pt x="66" y="13"/>
+                  </a:cubicBezTo>
+                  <a:cubicBezTo>
+                    <a:pt x="66" y="15"/>
+                    <a:pt x="66" y="17"/>
+                    <a:pt x="66" y="20"/>
+                  </a:cubicBezTo>
+                  <a:cubicBezTo>
+                    <a:pt x="65" y="23"/>
+                    <a:pt x="64" y="26"/>
+                    <a:pt x="62" y="29"/>
+                  </a:cubicBezTo>
+                  <a:cubicBezTo>
+                    <a:pt x="60" y="31"/>
+                    <a:pt x="57" y="32"/>
+                    <a:pt x="53" y="33"/>
+                  </a:cubicBezTo>
+                  <a:close/>
+                </a:path>
+              </a:pathLst>
+            </a:custGeom>
+            <a:solidFill>
+              <a:schemeClr val="accent2"/>
+            </a:solidFill>
+            <a:ln>
+              <a:noFill/>
+            </a:ln>
+          </p:spPr>
+          <p:txBody>
+            <a:bodyPr vert="horz" wrap="square" lIns="91440" tIns="45720" rIns="91440" bIns="45720" numCol="1" anchor="t" anchorCtr="0" compatLnSpc="1">
+              <a:prstTxWarp prst="textNoShape">
+                <a:avLst/>
+              </a:prstTxWarp>
+            </a:bodyPr>
+            <a:lstStyle/>
+            <a:p>
+              <a:endParaRPr lang="en-US">
+                <a:solidFill>
+                  <a:schemeClr val="accent3"/>
+                </a:solidFill>
+              </a:endParaRPr>
+            </a:p>
+          </p:txBody>
+        </p:sp>
+        <p:sp>
+          <p:nvSpPr>
+            <p:cNvPr id="43" name="Freeform 84">
+              <a:extLst>
+                <a:ext uri="{FF2B5EF4-FFF2-40B4-BE49-F238E27FC236}">
+                  <a16:creationId xmlns:a16="http://schemas.microsoft.com/office/drawing/2014/main" id="{270C485D-6BA8-4BF7-B72C-2B14A43A6648}"/>
+                </a:ext>
+                <a:ext uri="{C183D7F6-B498-43B3-948B-1728B52AA6E4}">
+                  <adec:decorative xmlns:adec="http://schemas.microsoft.com/office/drawing/2017/decorative" val="1"/>
+                </a:ext>
+              </a:extLst>
+            </p:cNvPr>
+            <p:cNvSpPr>
+              <a:spLocks/>
+            </p:cNvSpPr>
+            <p:nvPr>
+              <p:extLst>
+                <p:ext uri="{386F3935-93C4-4BCD-93E2-E3B085C9AB24}">
+                  <p16:designElem xmlns:p16="http://schemas.microsoft.com/office/powerpoint/2015/main" val="1"/>
+                </p:ext>
+              </p:extLst>
+            </p:nvPr>
+          </p:nvSpPr>
+          <p:spPr bwMode="auto">
+            <a:xfrm rot="6274527">
+              <a:off x="6910134" y="5062687"/>
+              <a:ext cx="647637" cy="678578"/>
+            </a:xfrm>
+            <a:custGeom>
+              <a:avLst/>
+              <a:gdLst>
+                <a:gd name="T0" fmla="*/ 4 w 57"/>
+                <a:gd name="T1" fmla="*/ 34 h 60"/>
+                <a:gd name="T2" fmla="*/ 17 w 57"/>
+                <a:gd name="T3" fmla="*/ 18 h 60"/>
+                <a:gd name="T4" fmla="*/ 26 w 57"/>
+                <a:gd name="T5" fmla="*/ 8 h 60"/>
+                <a:gd name="T6" fmla="*/ 29 w 57"/>
+                <a:gd name="T7" fmla="*/ 5 h 60"/>
+                <a:gd name="T8" fmla="*/ 41 w 57"/>
+                <a:gd name="T9" fmla="*/ 0 h 60"/>
+                <a:gd name="T10" fmla="*/ 51 w 57"/>
+                <a:gd name="T11" fmla="*/ 6 h 60"/>
+                <a:gd name="T12" fmla="*/ 56 w 57"/>
+                <a:gd name="T13" fmla="*/ 16 h 60"/>
+                <a:gd name="T14" fmla="*/ 51 w 57"/>
+                <a:gd name="T15" fmla="*/ 28 h 60"/>
+                <a:gd name="T16" fmla="*/ 29 w 57"/>
+                <a:gd name="T17" fmla="*/ 53 h 60"/>
+                <a:gd name="T18" fmla="*/ 17 w 57"/>
+                <a:gd name="T19" fmla="*/ 59 h 60"/>
+                <a:gd name="T20" fmla="*/ 5 w 57"/>
+                <a:gd name="T21" fmla="*/ 54 h 60"/>
+                <a:gd name="T22" fmla="*/ 0 w 57"/>
+                <a:gd name="T23" fmla="*/ 45 h 60"/>
+                <a:gd name="T24" fmla="*/ 4 w 57"/>
+                <a:gd name="T25" fmla="*/ 34 h 60"/>
+              </a:gdLst>
+              <a:ahLst/>
+              <a:cxnLst>
+                <a:cxn ang="0">
+                  <a:pos x="T0" y="T1"/>
+                </a:cxn>
+                <a:cxn ang="0">
+                  <a:pos x="T2" y="T3"/>
+                </a:cxn>
+                <a:cxn ang="0">
+                  <a:pos x="T4" y="T5"/>
+                </a:cxn>
+                <a:cxn ang="0">
+                  <a:pos x="T6" y="T7"/>
+                </a:cxn>
+                <a:cxn ang="0">
+                  <a:pos x="T8" y="T9"/>
+                </a:cxn>
+                <a:cxn ang="0">
+                  <a:pos x="T10" y="T11"/>
+                </a:cxn>
+                <a:cxn ang="0">
+                  <a:pos x="T12" y="T13"/>
+                </a:cxn>
+                <a:cxn ang="0">
+                  <a:pos x="T14" y="T15"/>
+                </a:cxn>
+                <a:cxn ang="0">
+                  <a:pos x="T16" y="T17"/>
+                </a:cxn>
+                <a:cxn ang="0">
+                  <a:pos x="T18" y="T19"/>
+                </a:cxn>
+                <a:cxn ang="0">
+                  <a:pos x="T20" y="T21"/>
+                </a:cxn>
+                <a:cxn ang="0">
+                  <a:pos x="T22" y="T23"/>
+                </a:cxn>
+                <a:cxn ang="0">
+                  <a:pos x="T24" y="T25"/>
+                </a:cxn>
+              </a:cxnLst>
+              <a:rect l="0" t="0" r="r" b="b"/>
+              <a:pathLst>
+                <a:path w="57" h="60">
+                  <a:moveTo>
+                    <a:pt x="4" y="34"/>
+                  </a:moveTo>
+                  <a:cubicBezTo>
+                    <a:pt x="5" y="33"/>
+                    <a:pt x="17" y="18"/>
+                    <a:pt x="17" y="18"/>
+                  </a:cubicBezTo>
+                  <a:cubicBezTo>
+                    <a:pt x="21" y="14"/>
+                    <a:pt x="24" y="10"/>
+                    <a:pt x="26" y="8"/>
+                  </a:cubicBezTo>
+                  <a:cubicBezTo>
+                    <a:pt x="29" y="5"/>
+                    <a:pt x="29" y="5"/>
+                    <a:pt x="29" y="5"/>
+                  </a:cubicBezTo>
+                  <a:cubicBezTo>
+                    <a:pt x="34" y="2"/>
+                    <a:pt x="38" y="0"/>
+                    <a:pt x="41" y="0"/>
+                  </a:cubicBezTo>
+                  <a:cubicBezTo>
+                    <a:pt x="44" y="1"/>
+                    <a:pt x="47" y="2"/>
+                    <a:pt x="51" y="6"/>
+                  </a:cubicBezTo>
+                  <a:cubicBezTo>
+                    <a:pt x="55" y="10"/>
+                    <a:pt x="57" y="13"/>
+                    <a:pt x="56" y="16"/>
+                  </a:cubicBezTo>
+                  <a:cubicBezTo>
+                    <a:pt x="56" y="19"/>
+                    <a:pt x="54" y="23"/>
+                    <a:pt x="51" y="28"/>
+                  </a:cubicBezTo>
+                  <a:cubicBezTo>
+                    <a:pt x="51" y="28"/>
+                    <a:pt x="33" y="48"/>
+                    <a:pt x="29" y="53"/>
+                  </a:cubicBezTo>
+                  <a:cubicBezTo>
+                    <a:pt x="25" y="57"/>
+                    <a:pt x="21" y="59"/>
+                    <a:pt x="17" y="59"/>
+                  </a:cubicBezTo>
+                  <a:cubicBezTo>
+                    <a:pt x="13" y="60"/>
+                    <a:pt x="9" y="58"/>
+                    <a:pt x="5" y="54"/>
+                  </a:cubicBezTo>
+                  <a:cubicBezTo>
+                    <a:pt x="2" y="51"/>
+                    <a:pt x="0" y="48"/>
+                    <a:pt x="0" y="45"/>
+                  </a:cubicBezTo>
+                  <a:cubicBezTo>
+                    <a:pt x="0" y="42"/>
+                    <a:pt x="2" y="38"/>
+                    <a:pt x="4" y="34"/>
+                  </a:cubicBezTo>
+                  <a:close/>
+                </a:path>
+              </a:pathLst>
+            </a:custGeom>
+            <a:solidFill>
+              <a:schemeClr val="accent2"/>
+            </a:solidFill>
+            <a:ln>
+              <a:noFill/>
+            </a:ln>
+          </p:spPr>
+          <p:txBody>
+            <a:bodyPr vert="horz" wrap="square" lIns="91440" tIns="45720" rIns="91440" bIns="45720" numCol="1" anchor="t" anchorCtr="0" compatLnSpc="1">
+              <a:prstTxWarp prst="textNoShape">
+                <a:avLst/>
+              </a:prstTxWarp>
+            </a:bodyPr>
+            <a:lstStyle/>
+            <a:p>
+              <a:endParaRPr lang="en-US">
+                <a:solidFill>
+                  <a:schemeClr val="accent3"/>
+                </a:solidFill>
+              </a:endParaRPr>
+            </a:p>
+          </p:txBody>
+        </p:sp>
+        <p:sp>
+          <p:nvSpPr>
+            <p:cNvPr id="44" name="Freeform 87">
+              <a:extLst>
+                <a:ext uri="{FF2B5EF4-FFF2-40B4-BE49-F238E27FC236}">
+                  <a16:creationId xmlns:a16="http://schemas.microsoft.com/office/drawing/2014/main" id="{79239B91-4327-43B3-AED5-CB9EC1653B47}"/>
+                </a:ext>
+                <a:ext uri="{C183D7F6-B498-43B3-948B-1728B52AA6E4}">
+                  <adec:decorative xmlns:adec="http://schemas.microsoft.com/office/drawing/2017/decorative" val="1"/>
+                </a:ext>
+              </a:extLst>
+            </p:cNvPr>
+            <p:cNvSpPr>
+              <a:spLocks/>
+            </p:cNvSpPr>
+            <p:nvPr>
+              <p:extLst>
+                <p:ext uri="{386F3935-93C4-4BCD-93E2-E3B085C9AB24}">
+                  <p16:designElem xmlns:p16="http://schemas.microsoft.com/office/powerpoint/2015/main" val="1"/>
+                </p:ext>
+              </p:extLst>
+            </p:nvPr>
+          </p:nvSpPr>
+          <p:spPr bwMode="auto">
+            <a:xfrm rot="4430858">
+              <a:off x="4571743" y="5071596"/>
+              <a:ext cx="626472" cy="670149"/>
+            </a:xfrm>
+            <a:custGeom>
+              <a:avLst/>
+              <a:gdLst>
+                <a:gd name="T0" fmla="*/ 0 w 55"/>
+                <a:gd name="T1" fmla="*/ 17 h 59"/>
+                <a:gd name="T2" fmla="*/ 1 w 55"/>
+                <a:gd name="T3" fmla="*/ 11 h 59"/>
+                <a:gd name="T4" fmla="*/ 4 w 55"/>
+                <a:gd name="T5" fmla="*/ 6 h 59"/>
+                <a:gd name="T6" fmla="*/ 7 w 55"/>
+                <a:gd name="T7" fmla="*/ 4 h 59"/>
+                <a:gd name="T8" fmla="*/ 14 w 55"/>
+                <a:gd name="T9" fmla="*/ 0 h 59"/>
+                <a:gd name="T10" fmla="*/ 23 w 55"/>
+                <a:gd name="T11" fmla="*/ 3 h 59"/>
+                <a:gd name="T12" fmla="*/ 31 w 55"/>
+                <a:gd name="T13" fmla="*/ 11 h 59"/>
+                <a:gd name="T14" fmla="*/ 38 w 55"/>
+                <a:gd name="T15" fmla="*/ 20 h 59"/>
+                <a:gd name="T16" fmla="*/ 48 w 55"/>
+                <a:gd name="T17" fmla="*/ 31 h 59"/>
+                <a:gd name="T18" fmla="*/ 55 w 55"/>
+                <a:gd name="T19" fmla="*/ 43 h 59"/>
+                <a:gd name="T20" fmla="*/ 49 w 55"/>
+                <a:gd name="T21" fmla="*/ 55 h 59"/>
+                <a:gd name="T22" fmla="*/ 38 w 55"/>
+                <a:gd name="T23" fmla="*/ 59 h 59"/>
+                <a:gd name="T24" fmla="*/ 33 w 55"/>
+                <a:gd name="T25" fmla="*/ 58 h 59"/>
+                <a:gd name="T26" fmla="*/ 26 w 55"/>
+                <a:gd name="T27" fmla="*/ 53 h 59"/>
+                <a:gd name="T28" fmla="*/ 5 w 55"/>
+                <a:gd name="T29" fmla="*/ 27 h 59"/>
+                <a:gd name="T30" fmla="*/ 0 w 55"/>
+                <a:gd name="T31" fmla="*/ 17 h 59"/>
+              </a:gdLst>
+              <a:ahLst/>
+              <a:cxnLst>
+                <a:cxn ang="0">
+                  <a:pos x="T0" y="T1"/>
+                </a:cxn>
+                <a:cxn ang="0">
+                  <a:pos x="T2" y="T3"/>
+                </a:cxn>
+                <a:cxn ang="0">
+                  <a:pos x="T4" y="T5"/>
+                </a:cxn>
+                <a:cxn ang="0">
+                  <a:pos x="T6" y="T7"/>
+                </a:cxn>
+                <a:cxn ang="0">
+                  <a:pos x="T8" y="T9"/>
+                </a:cxn>
+                <a:cxn ang="0">
+                  <a:pos x="T10" y="T11"/>
+                </a:cxn>
+                <a:cxn ang="0">
+                  <a:pos x="T12" y="T13"/>
+                </a:cxn>
+                <a:cxn ang="0">
+                  <a:pos x="T14" y="T15"/>
+                </a:cxn>
+                <a:cxn ang="0">
+                  <a:pos x="T16" y="T17"/>
+                </a:cxn>
+                <a:cxn ang="0">
+                  <a:pos x="T18" y="T19"/>
+                </a:cxn>
+                <a:cxn ang="0">
+                  <a:pos x="T20" y="T21"/>
+                </a:cxn>
+                <a:cxn ang="0">
+                  <a:pos x="T22" y="T23"/>
+                </a:cxn>
+                <a:cxn ang="0">
+                  <a:pos x="T24" y="T25"/>
+                </a:cxn>
+                <a:cxn ang="0">
+                  <a:pos x="T26" y="T27"/>
+                </a:cxn>
+                <a:cxn ang="0">
+                  <a:pos x="T28" y="T29"/>
+                </a:cxn>
+                <a:cxn ang="0">
+                  <a:pos x="T30" y="T31"/>
+                </a:cxn>
+              </a:cxnLst>
+              <a:rect l="0" t="0" r="r" b="b"/>
+              <a:pathLst>
+                <a:path w="55" h="59">
+                  <a:moveTo>
+                    <a:pt x="0" y="17"/>
+                  </a:moveTo>
+                  <a:cubicBezTo>
+                    <a:pt x="0" y="14"/>
+                    <a:pt x="0" y="12"/>
+                    <a:pt x="1" y="11"/>
+                  </a:cubicBezTo>
+                  <a:cubicBezTo>
+                    <a:pt x="2" y="9"/>
+                    <a:pt x="3" y="8"/>
+                    <a:pt x="4" y="6"/>
+                  </a:cubicBezTo>
+                  <a:cubicBezTo>
+                    <a:pt x="6" y="5"/>
+                    <a:pt x="7" y="4"/>
+                    <a:pt x="7" y="4"/>
+                  </a:cubicBezTo>
+                  <a:cubicBezTo>
+                    <a:pt x="9" y="2"/>
+                    <a:pt x="12" y="1"/>
+                    <a:pt x="14" y="0"/>
+                  </a:cubicBezTo>
+                  <a:cubicBezTo>
+                    <a:pt x="17" y="0"/>
+                    <a:pt x="20" y="1"/>
+                    <a:pt x="23" y="3"/>
+                  </a:cubicBezTo>
+                  <a:cubicBezTo>
+                    <a:pt x="26" y="4"/>
+                    <a:pt x="29" y="7"/>
+                    <a:pt x="31" y="11"/>
+                  </a:cubicBezTo>
+                  <a:cubicBezTo>
+                    <a:pt x="38" y="20"/>
+                    <a:pt x="38" y="20"/>
+                    <a:pt x="38" y="20"/>
+                  </a:cubicBezTo>
+                  <a:cubicBezTo>
+                    <a:pt x="48" y="31"/>
+                    <a:pt x="48" y="31"/>
+                    <a:pt x="48" y="31"/>
+                  </a:cubicBezTo>
+                  <a:cubicBezTo>
+                    <a:pt x="52" y="36"/>
+                    <a:pt x="54" y="40"/>
+                    <a:pt x="55" y="43"/>
+                  </a:cubicBezTo>
+                  <a:cubicBezTo>
+                    <a:pt x="55" y="47"/>
+                    <a:pt x="54" y="52"/>
+                    <a:pt x="49" y="55"/>
+                  </a:cubicBezTo>
+                  <a:cubicBezTo>
+                    <a:pt x="45" y="58"/>
+                    <a:pt x="41" y="59"/>
+                    <a:pt x="38" y="59"/>
+                  </a:cubicBezTo>
+                  <a:cubicBezTo>
+                    <a:pt x="37" y="59"/>
+                    <a:pt x="35" y="59"/>
+                    <a:pt x="33" y="58"/>
+                  </a:cubicBezTo>
+                  <a:cubicBezTo>
+                    <a:pt x="31" y="57"/>
+                    <a:pt x="29" y="55"/>
+                    <a:pt x="26" y="53"/>
+                  </a:cubicBezTo>
+                  <a:cubicBezTo>
+                    <a:pt x="23" y="50"/>
+                    <a:pt x="5" y="27"/>
+                    <a:pt x="5" y="27"/>
+                  </a:cubicBezTo>
+                  <a:cubicBezTo>
+                    <a:pt x="2" y="23"/>
+                    <a:pt x="0" y="19"/>
+                    <a:pt x="0" y="17"/>
+                  </a:cubicBezTo>
+                  <a:close/>
+                </a:path>
+              </a:pathLst>
+            </a:custGeom>
+            <a:solidFill>
+              <a:schemeClr val="accent2"/>
+            </a:solidFill>
+            <a:ln>
+              <a:noFill/>
+            </a:ln>
+          </p:spPr>
+          <p:txBody>
+            <a:bodyPr vert="horz" wrap="square" lIns="91440" tIns="45720" rIns="91440" bIns="45720" numCol="1" anchor="t" anchorCtr="0" compatLnSpc="1">
+              <a:prstTxWarp prst="textNoShape">
+                <a:avLst/>
+              </a:prstTxWarp>
+            </a:bodyPr>
+            <a:lstStyle/>
+            <a:p>
+              <a:endParaRPr lang="en-US">
+                <a:solidFill>
+                  <a:schemeClr val="accent3"/>
+                </a:solidFill>
+              </a:endParaRPr>
+            </a:p>
+          </p:txBody>
+        </p:sp>
+      </p:grpSp>
+      <p:pic>
+        <p:nvPicPr>
+          <p:cNvPr id="4" name="Picture 3">
+            <a:extLst>
+              <a:ext uri="{FF2B5EF4-FFF2-40B4-BE49-F238E27FC236}">
+                <a16:creationId xmlns:a16="http://schemas.microsoft.com/office/drawing/2014/main" id="{A1E43282-D210-764C-A49C-E48423A29232}"/>
+              </a:ext>
+            </a:extLst>
+          </p:cNvPr>
+          <p:cNvPicPr>
+            <a:picLocks noChangeAspect="1"/>
+          </p:cNvPicPr>
+          <p:nvPr/>
+        </p:nvPicPr>
+        <p:blipFill rotWithShape="1">
+          <a:blip r:embed="rId3"/>
+          <a:srcRect r="3888"/>
+          <a:stretch/>
+        </p:blipFill>
+        <p:spPr>
+          <a:xfrm>
+            <a:off x="6329918" y="93600"/>
+            <a:ext cx="5862082" cy="3430800"/>
+          </a:xfrm>
+          <a:custGeom>
+            <a:avLst/>
+            <a:gdLst/>
+            <a:ahLst/>
+            <a:cxnLst/>
+            <a:rect l="l" t="t" r="r" b="b"/>
+            <a:pathLst>
+              <a:path w="5862082" h="3430800">
+                <a:moveTo>
+                  <a:pt x="0" y="0"/>
+                </a:moveTo>
+                <a:lnTo>
+                  <a:pt x="5862082" y="0"/>
+                </a:lnTo>
+                <a:lnTo>
+                  <a:pt x="5862082" y="3430800"/>
+                </a:lnTo>
+                <a:lnTo>
+                  <a:pt x="15574" y="3430800"/>
+                </a:lnTo>
+                <a:lnTo>
+                  <a:pt x="15542" y="3272467"/>
+                </a:lnTo>
+                <a:cubicBezTo>
+                  <a:pt x="16280" y="3099651"/>
+                  <a:pt x="19396" y="2957011"/>
+                  <a:pt x="25362" y="2852016"/>
+                </a:cubicBezTo>
+                <a:cubicBezTo>
+                  <a:pt x="43523" y="2377506"/>
+                  <a:pt x="24435" y="1267222"/>
+                  <a:pt x="2054" y="105785"/>
+                </a:cubicBezTo>
+                <a:close/>
+              </a:path>
+            </a:pathLst>
+          </a:custGeom>
+          <a:noFill/>
+        </p:spPr>
+      </p:pic>
+    </p:spTree>
+    <p:extLst>
+      <p:ext uri="{BB962C8B-B14F-4D97-AF65-F5344CB8AC3E}">
+        <p14:creationId xmlns:p14="http://schemas.microsoft.com/office/powerpoint/2010/main" val="1039646967"/>
+      </p:ext>
+    </p:extLst>
+  </p:cSld>
+  <p:clrMapOvr>
+    <a:masterClrMapping/>
+  </p:clrMapOvr>
+</p:sld>
+</file>
+
+<file path=ppt/slides/slide9.xml><?xml version="1.0" encoding="utf-8"?>
+<p:sld xmlns:a="http://schemas.openxmlformats.org/drawingml/2006/main" xmlns:r="http://schemas.openxmlformats.org/officeDocument/2006/relationships" xmlns:p="http://schemas.openxmlformats.org/presentationml/2006/main">
+  <p:cSld>
+    <p:bg>
+      <p:bgPr>
+        <a:solidFill>
+          <a:schemeClr val="bg2"/>
+        </a:solidFill>
+        <a:effectLst/>
+      </p:bgPr>
+    </p:bg>
+    <p:spTree>
+      <p:nvGrpSpPr>
+        <p:cNvPr id="1" name=""/>
+        <p:cNvGrpSpPr/>
+        <p:nvPr/>
+      </p:nvGrpSpPr>
+      <p:grpSpPr>
+        <a:xfrm>
+          <a:off x="0" y="0"/>
+          <a:ext cx="0" cy="0"/>
+          <a:chOff x="0" y="0"/>
+          <a:chExt cx="0" cy="0"/>
+        </a:xfrm>
+      </p:grpSpPr>
+      <p:sp>
+        <p:nvSpPr>
+          <p:cNvPr id="8" name="Rectangle 7">
+            <a:extLst>
+              <a:ext uri="{FF2B5EF4-FFF2-40B4-BE49-F238E27FC236}">
+                <a16:creationId xmlns:a16="http://schemas.microsoft.com/office/drawing/2014/main" id="{09646535-AEF6-4883-A4F9-EEC1F8B4319E}"/>
+              </a:ext>
+              <a:ext uri="{C183D7F6-B498-43B3-948B-1728B52AA6E4}">
+                <adec:decorative xmlns:adec="http://schemas.microsoft.com/office/drawing/2017/decorative" val="1"/>
+              </a:ext>
+            </a:extLst>
+          </p:cNvPr>
+          <p:cNvSpPr>
+            <a:spLocks noGrp="1" noRot="1" noChangeAspect="1" noMove="1" noResize="1" noEditPoints="1" noAdjustHandles="1" noChangeArrowheads="1" noChangeShapeType="1" noTextEdit="1"/>
+          </p:cNvSpPr>
+          <p:nvPr>
+            <p:extLst>
+              <p:ext uri="{386F3935-93C4-4BCD-93E2-E3B085C9AB24}">
+                <p16:designElem xmlns:p16="http://schemas.microsoft.com/office/powerpoint/2015/main" val="1"/>
+              </p:ext>
+            </p:extLst>
+          </p:nvPr>
+        </p:nvSpPr>
+        <p:spPr>
+          <a:xfrm>
+            <a:off x="0" y="0"/>
+            <a:ext cx="12192000" cy="6858000"/>
+          </a:xfrm>
+          <a:prstGeom prst="rect">
+            <a:avLst/>
+          </a:prstGeom>
+          <a:solidFill>
+            <a:schemeClr val="bg2">
+              <a:lumMod val="90000"/>
+              <a:lumOff val="10000"/>
+            </a:schemeClr>
+          </a:solidFill>
+          <a:ln w="12700" cap="flat" cmpd="sng" algn="ctr">
+            <a:noFill/>
+            <a:prstDash val="solid"/>
+            <a:miter lim="800000"/>
+          </a:ln>
+          <a:effectLst/>
+        </p:spPr>
+        <p:style>
+          <a:lnRef idx="2">
+            <a:schemeClr val="accent1">
+              <a:shade val="50000"/>
+            </a:schemeClr>
+          </a:lnRef>
+          <a:fillRef idx="1">
+            <a:schemeClr val="accent1"/>
+          </a:fillRef>
+          <a:effectRef idx="0">
+            <a:schemeClr val="accent1"/>
+          </a:effectRef>
+          <a:fontRef idx="minor">
+            <a:schemeClr val="lt1"/>
+          </a:fontRef>
+        </p:style>
+        <p:txBody>
+          <a:bodyPr rtlCol="0" anchor="ctr"/>
+          <a:lstStyle/>
+          <a:p>
+            <a:pPr algn="ctr"/>
+            <a:endParaRPr lang="en-US"/>
+          </a:p>
+        </p:txBody>
+      </p:sp>
+      <p:sp>
+        <p:nvSpPr>
+          <p:cNvPr id="10" name="Rectangle 9">
+            <a:extLst>
+              <a:ext uri="{FF2B5EF4-FFF2-40B4-BE49-F238E27FC236}">
+                <a16:creationId xmlns:a16="http://schemas.microsoft.com/office/drawing/2014/main" id="{DB7EFF05-A8DA-4B3E-9C21-7A04283D4852}"/>
+              </a:ext>
+              <a:ext uri="{C183D7F6-B498-43B3-948B-1728B52AA6E4}">
+                <adec:decorative xmlns:adec="http://schemas.microsoft.com/office/drawing/2017/decorative" val="1"/>
+              </a:ext>
+            </a:extLst>
+          </p:cNvPr>
+          <p:cNvSpPr>
+            <a:spLocks noGrp="1" noRot="1" noChangeAspect="1" noMove="1" noResize="1" noEditPoints="1" noAdjustHandles="1" noChangeArrowheads="1" noChangeShapeType="1" noTextEdit="1"/>
+          </p:cNvSpPr>
+          <p:nvPr>
+            <p:extLst>
+              <p:ext uri="{386F3935-93C4-4BCD-93E2-E3B085C9AB24}">
+                <p16:designElem xmlns:p16="http://schemas.microsoft.com/office/powerpoint/2015/main" val="1"/>
+              </p:ext>
+            </p:extLst>
+          </p:nvPr>
+        </p:nvSpPr>
+        <p:spPr>
+          <a:xfrm>
+            <a:off x="0" y="0"/>
+            <a:ext cx="12192000" cy="6858000"/>
+          </a:xfrm>
+          <a:prstGeom prst="rect">
+            <a:avLst/>
+          </a:prstGeom>
+          <a:solidFill>
+            <a:schemeClr val="bg2">
+              <a:lumMod val="90000"/>
+              <a:lumOff val="10000"/>
+            </a:schemeClr>
+          </a:solidFill>
+          <a:ln w="12700" cap="flat" cmpd="sng" algn="ctr">
+            <a:noFill/>
+            <a:prstDash val="solid"/>
+            <a:miter lim="800000"/>
+          </a:ln>
+          <a:effectLst/>
+        </p:spPr>
+        <p:style>
+          <a:lnRef idx="2">
+            <a:schemeClr val="accent1">
+              <a:shade val="50000"/>
+            </a:schemeClr>
+          </a:lnRef>
+          <a:fillRef idx="1">
+            <a:schemeClr val="accent1"/>
+          </a:fillRef>
+          <a:effectRef idx="0">
+            <a:schemeClr val="accent1"/>
+          </a:effectRef>
+          <a:fontRef idx="minor">
+            <a:schemeClr val="lt1"/>
+          </a:fontRef>
+        </p:style>
+        <p:txBody>
+          <a:bodyPr rtlCol="0" anchor="ctr"/>
+          <a:lstStyle/>
+          <a:p>
+            <a:pPr algn="ctr"/>
+            <a:endParaRPr lang="en-US"/>
+          </a:p>
+        </p:txBody>
+      </p:sp>
+      <p:sp useBgFill="1">
+        <p:nvSpPr>
+          <p:cNvPr id="12" name="Rectangle 11">
+            <a:extLst>
+              <a:ext uri="{FF2B5EF4-FFF2-40B4-BE49-F238E27FC236}">
+                <a16:creationId xmlns:a16="http://schemas.microsoft.com/office/drawing/2014/main" id="{44CA1620-2C02-4B4E-97C8-06FCE85EEB0E}"/>
+              </a:ext>
+              <a:ext uri="{C183D7F6-B498-43B3-948B-1728B52AA6E4}">
+                <adec:decorative xmlns:adec="http://schemas.microsoft.com/office/drawing/2017/decorative" val="1"/>
+              </a:ext>
+            </a:extLst>
+          </p:cNvPr>
+          <p:cNvSpPr>
+            <a:spLocks noGrp="1" noRot="1" noChangeAspect="1" noMove="1" noResize="1" noEditPoints="1" noAdjustHandles="1" noChangeArrowheads="1" noChangeShapeType="1" noTextEdit="1"/>
+          </p:cNvSpPr>
+          <p:nvPr>
+            <p:extLst>
+              <p:ext uri="{386F3935-93C4-4BCD-93E2-E3B085C9AB24}">
+                <p16:designElem xmlns:p16="http://schemas.microsoft.com/office/powerpoint/2015/main" val="1"/>
+              </p:ext>
+            </p:extLst>
+          </p:nvPr>
+        </p:nvSpPr>
+        <p:spPr>
+          <a:xfrm>
+            <a:off x="0" y="0"/>
+            <a:ext cx="12192000" cy="6858000"/>
+          </a:xfrm>
+          <a:prstGeom prst="rect">
+            <a:avLst/>
+          </a:prstGeom>
+          <a:ln w="12700" cap="flat" cmpd="sng" algn="ctr">
+            <a:noFill/>
+            <a:prstDash val="solid"/>
+            <a:miter lim="800000"/>
+          </a:ln>
+          <a:effectLst/>
+        </p:spPr>
+        <p:style>
+          <a:lnRef idx="2">
+            <a:schemeClr val="accent1">
+              <a:shade val="50000"/>
+            </a:schemeClr>
+          </a:lnRef>
+          <a:fillRef idx="1">
+            <a:schemeClr val="accent1"/>
+          </a:fillRef>
+          <a:effectRef idx="0">
+            <a:schemeClr val="accent1"/>
+          </a:effectRef>
+          <a:fontRef idx="minor">
+            <a:schemeClr val="lt1"/>
+          </a:fontRef>
+        </p:style>
+        <p:txBody>
+          <a:bodyPr rtlCol="0" anchor="ctr"/>
+          <a:lstStyle/>
+          <a:p>
+            <a:pPr algn="ctr"/>
+            <a:endParaRPr lang="en-US"/>
+          </a:p>
+        </p:txBody>
+      </p:sp>
+      <p:sp>
+        <p:nvSpPr>
+          <p:cNvPr id="14" name="Rectangle 13">
+            <a:extLst>
+              <a:ext uri="{FF2B5EF4-FFF2-40B4-BE49-F238E27FC236}">
+                <a16:creationId xmlns:a16="http://schemas.microsoft.com/office/drawing/2014/main" id="{3657DE79-27F8-4881-BE3B-5321D1801425}"/>
+              </a:ext>
+              <a:ext uri="{C183D7F6-B498-43B3-948B-1728B52AA6E4}">
+                <adec:decorative xmlns:adec="http://schemas.microsoft.com/office/drawing/2017/decorative" val="1"/>
+              </a:ext>
+            </a:extLst>
+          </p:cNvPr>
+          <p:cNvSpPr>
+            <a:spLocks noGrp="1" noRot="1" noChangeAspect="1" noMove="1" noResize="1" noEditPoints="1" noAdjustHandles="1" noChangeArrowheads="1" noChangeShapeType="1" noTextEdit="1"/>
+          </p:cNvSpPr>
+          <p:nvPr>
+            <p:extLst>
+              <p:ext uri="{386F3935-93C4-4BCD-93E2-E3B085C9AB24}">
+                <p16:designElem xmlns:p16="http://schemas.microsoft.com/office/powerpoint/2015/main" val="1"/>
+              </p:ext>
+            </p:extLst>
+          </p:nvPr>
+        </p:nvSpPr>
+        <p:spPr>
+          <a:xfrm>
+            <a:off x="0" y="0"/>
+            <a:ext cx="12192000" cy="6858000"/>
+          </a:xfrm>
+          <a:prstGeom prst="rect">
+            <a:avLst/>
+          </a:prstGeom>
+          <a:solidFill>
+            <a:schemeClr val="bg2">
+              <a:lumMod val="90000"/>
+              <a:lumOff val="10000"/>
+            </a:schemeClr>
+          </a:solidFill>
+          <a:ln w="12700" cap="flat" cmpd="sng" algn="ctr">
+            <a:noFill/>
+            <a:prstDash val="solid"/>
+            <a:miter lim="800000"/>
+          </a:ln>
+          <a:effectLst/>
+        </p:spPr>
+        <p:style>
+          <a:lnRef idx="2">
+            <a:schemeClr val="accent1">
+              <a:shade val="50000"/>
+            </a:schemeClr>
+          </a:lnRef>
+          <a:fillRef idx="1">
+            <a:schemeClr val="accent1"/>
+          </a:fillRef>
+          <a:effectRef idx="0">
+            <a:schemeClr val="accent1"/>
+          </a:effectRef>
+          <a:fontRef idx="minor">
+            <a:schemeClr val="lt1"/>
+          </a:fontRef>
+        </p:style>
+        <p:txBody>
+          <a:bodyPr rtlCol="0" anchor="ctr"/>
+          <a:lstStyle/>
+          <a:p>
+            <a:pPr algn="ctr"/>
+            <a:endParaRPr lang="en-US"/>
+          </a:p>
+        </p:txBody>
+      </p:sp>
+      <p:grpSp>
+        <p:nvGrpSpPr>
+          <p:cNvPr id="16" name="Group 15">
+            <a:extLst>
+              <a:ext uri="{FF2B5EF4-FFF2-40B4-BE49-F238E27FC236}">
+                <a16:creationId xmlns:a16="http://schemas.microsoft.com/office/drawing/2014/main" id="{DB733608-1322-485D-B942-B827E6997F08}"/>
+              </a:ext>
+              <a:ext uri="{C183D7F6-B498-43B3-948B-1728B52AA6E4}">
+                <adec:decorative xmlns:adec="http://schemas.microsoft.com/office/drawing/2017/decorative" val="1"/>
+              </a:ext>
+            </a:extLst>
+          </p:cNvPr>
+          <p:cNvGrpSpPr>
+            <a:grpSpLocks noGrp="1" noUngrp="1" noRot="1" noChangeAspect="1" noMove="1" noResize="1"/>
+          </p:cNvGrpSpPr>
+          <p:nvPr>
+            <p:extLst>
+              <p:ext uri="{386F3935-93C4-4BCD-93E2-E3B085C9AB24}">
+                <p16:designElem xmlns:p16="http://schemas.microsoft.com/office/powerpoint/2015/main" val="1"/>
+              </p:ext>
+            </p:extLst>
+          </p:nvPr>
+        </p:nvGrpSpPr>
+        <p:grpSpPr>
+          <a:xfrm>
+            <a:off x="643527" y="954724"/>
+            <a:ext cx="10904945" cy="3364228"/>
+            <a:chOff x="643527" y="954724"/>
+            <a:chExt cx="10904945" cy="3364228"/>
+          </a:xfrm>
+        </p:grpSpPr>
+        <p:sp>
+          <p:nvSpPr>
+            <p:cNvPr id="17" name="Freeform 78">
+              <a:extLst>
+                <a:ext uri="{FF2B5EF4-FFF2-40B4-BE49-F238E27FC236}">
+                  <a16:creationId xmlns:a16="http://schemas.microsoft.com/office/drawing/2014/main" id="{7975F1CD-7143-447F-AC1A-8D3EA46ECA49}"/>
                 </a:ext>
                 <a:ext uri="{C183D7F6-B498-43B3-948B-1728B52AA6E4}">
                   <adec:decorative xmlns:adec="http://schemas.microsoft.com/office/drawing/2017/decorative" val="1"/>
@@ -26745,10 +28446,10 @@
         </p:sp>
         <p:sp>
           <p:nvSpPr>
-            <p:cNvPr id="17" name="Freeform 79">
+            <p:cNvPr id="18" name="Freeform 79">
               <a:extLst>
                 <a:ext uri="{FF2B5EF4-FFF2-40B4-BE49-F238E27FC236}">
-                  <a16:creationId xmlns:a16="http://schemas.microsoft.com/office/drawing/2014/main" id="{F72FB821-5AF0-4EA1-B84B-D5E12D8333A7}"/>
+                  <a16:creationId xmlns:a16="http://schemas.microsoft.com/office/drawing/2014/main" id="{501A6B8C-11DF-404A-89DD-354DA4C19327}"/>
                 </a:ext>
                 <a:ext uri="{C183D7F6-B498-43B3-948B-1728B52AA6E4}">
                   <adec:decorative xmlns:adec="http://schemas.microsoft.com/office/drawing/2017/decorative" val="1"/>
@@ -26868,10 +28569,10 @@
         </p:sp>
         <p:sp>
           <p:nvSpPr>
-            <p:cNvPr id="18" name="Freeform 85">
+            <p:cNvPr id="19" name="Freeform 85">
               <a:extLst>
                 <a:ext uri="{FF2B5EF4-FFF2-40B4-BE49-F238E27FC236}">
-                  <a16:creationId xmlns:a16="http://schemas.microsoft.com/office/drawing/2014/main" id="{DFE0F740-8A45-42B9-BEF6-A75329504FDC}"/>
+                  <a16:creationId xmlns:a16="http://schemas.microsoft.com/office/drawing/2014/main" id="{14D1F65C-CD34-4E1F-8743-D3879A8712C8}"/>
                 </a:ext>
                 <a:ext uri="{C183D7F6-B498-43B3-948B-1728B52AA6E4}">
                   <adec:decorative xmlns:adec="http://schemas.microsoft.com/office/drawing/2017/decorative" val="1"/>
@@ -27077,44 +28778,12 @@
             </a:p>
           </p:txBody>
         </p:sp>
-      </p:grpSp>
-      <p:grpSp>
-        <p:nvGrpSpPr>
-          <p:cNvPr id="20" name="Group 19">
-            <a:extLst>
-              <a:ext uri="{FF2B5EF4-FFF2-40B4-BE49-F238E27FC236}">
-                <a16:creationId xmlns:a16="http://schemas.microsoft.com/office/drawing/2014/main" id="{3214C51D-3B74-4CCB-82B8-A184460FCAA2}"/>
-              </a:ext>
-              <a:ext uri="{C183D7F6-B498-43B3-948B-1728B52AA6E4}">
-                <adec:decorative xmlns:adec="http://schemas.microsoft.com/office/drawing/2017/decorative" val="1"/>
-              </a:ext>
-            </a:extLst>
-          </p:cNvPr>
-          <p:cNvGrpSpPr>
-            <a:grpSpLocks noGrp="1" noUngrp="1" noRot="1" noChangeAspect="1" noMove="1" noResize="1"/>
-          </p:cNvGrpSpPr>
-          <p:nvPr>
-            <p:extLst>
-              <p:ext uri="{386F3935-93C4-4BCD-93E2-E3B085C9AB24}">
-                <p16:designElem xmlns:p16="http://schemas.microsoft.com/office/powerpoint/2015/main" val="1"/>
-              </p:ext>
-            </p:extLst>
-          </p:nvPr>
-        </p:nvGrpSpPr>
-        <p:grpSpPr>
-          <a:xfrm>
-            <a:off x="11025210" y="268794"/>
-            <a:ext cx="632305" cy="1606552"/>
-            <a:chOff x="10224385" y="954724"/>
-            <a:chExt cx="1324087" cy="3364228"/>
-          </a:xfrm>
-        </p:grpSpPr>
         <p:sp>
           <p:nvSpPr>
-            <p:cNvPr id="21" name="Freeform 80">
+            <p:cNvPr id="20" name="Freeform 80">
               <a:extLst>
                 <a:ext uri="{FF2B5EF4-FFF2-40B4-BE49-F238E27FC236}">
-                  <a16:creationId xmlns:a16="http://schemas.microsoft.com/office/drawing/2014/main" id="{66CD91DA-BDB8-476E-8111-2918188D6DE1}"/>
+                  <a16:creationId xmlns:a16="http://schemas.microsoft.com/office/drawing/2014/main" id="{E5C58F66-1B6C-4935-9BB4-583D612CD224}"/>
                 </a:ext>
                 <a:ext uri="{C183D7F6-B498-43B3-948B-1728B52AA6E4}">
                   <adec:decorative xmlns:adec="http://schemas.microsoft.com/office/drawing/2017/decorative" val="1"/>
@@ -27344,10 +29013,10 @@
         </p:sp>
         <p:sp>
           <p:nvSpPr>
-            <p:cNvPr id="22" name="Freeform 84">
+            <p:cNvPr id="21" name="Freeform 84">
               <a:extLst>
                 <a:ext uri="{FF2B5EF4-FFF2-40B4-BE49-F238E27FC236}">
-                  <a16:creationId xmlns:a16="http://schemas.microsoft.com/office/drawing/2014/main" id="{576CF7BA-63E8-47BF-AB8E-E9134BE8EF2C}"/>
+                  <a16:creationId xmlns:a16="http://schemas.microsoft.com/office/drawing/2014/main" id="{F41F116D-556B-4BC2-9DCD-46DA7CCC0E82}"/>
                 </a:ext>
                 <a:ext uri="{C183D7F6-B498-43B3-948B-1728B52AA6E4}">
                   <adec:decorative xmlns:adec="http://schemas.microsoft.com/office/drawing/2017/decorative" val="1"/>
@@ -27537,10 +29206,10 @@
         </p:sp>
         <p:sp>
           <p:nvSpPr>
-            <p:cNvPr id="23" name="Freeform 87">
+            <p:cNvPr id="22" name="Freeform 87">
               <a:extLst>
                 <a:ext uri="{FF2B5EF4-FFF2-40B4-BE49-F238E27FC236}">
-                  <a16:creationId xmlns:a16="http://schemas.microsoft.com/office/drawing/2014/main" id="{C0C95E2B-D068-4E18-85DE-266A42E6C69E}"/>
+                  <a16:creationId xmlns:a16="http://schemas.microsoft.com/office/drawing/2014/main" id="{DE46F0F4-2435-4BDC-A92C-EB13608804B0}"/>
                 </a:ext>
                 <a:ext uri="{C183D7F6-B498-43B3-948B-1728B52AA6E4}">
                   <adec:decorative xmlns:adec="http://schemas.microsoft.com/office/drawing/2017/decorative" val="1"/>
@@ -27759,64 +29428,110 @@
           </p:txBody>
         </p:sp>
       </p:grpSp>
-      <p:pic>
-        <p:nvPicPr>
-          <p:cNvPr id="4" name="Picture 3">
+      <p:sp>
+        <p:nvSpPr>
+          <p:cNvPr id="2" name="Title 1">
             <a:extLst>
               <a:ext uri="{FF2B5EF4-FFF2-40B4-BE49-F238E27FC236}">
-                <a16:creationId xmlns:a16="http://schemas.microsoft.com/office/drawing/2014/main" id="{A1E43282-D210-764C-A49C-E48423A29232}"/>
+                <a16:creationId xmlns:a16="http://schemas.microsoft.com/office/drawing/2014/main" id="{B8D4AC30-BE35-9948-A49A-B1CD2C7D1391}"/>
               </a:ext>
             </a:extLst>
           </p:cNvPr>
-          <p:cNvPicPr>
-            <a:picLocks noChangeAspect="1"/>
-          </p:cNvPicPr>
-          <p:nvPr/>
-        </p:nvPicPr>
-        <p:blipFill>
-          <a:blip r:embed="rId2"/>
-          <a:stretch>
-            <a:fillRect/>
-          </a:stretch>
-        </p:blipFill>
+          <p:cNvSpPr>
+            <a:spLocks noGrp="1"/>
+          </p:cNvSpPr>
+          <p:nvPr>
+            <p:ph type="title"/>
+          </p:nvPr>
+        </p:nvSpPr>
         <p:spPr>
           <a:xfrm>
-            <a:off x="1689376" y="1730841"/>
-            <a:ext cx="8470624" cy="4764724"/>
+            <a:off x="2640014" y="1334791"/>
+            <a:ext cx="6911974" cy="2803071"/>
           </a:xfrm>
-          <a:custGeom>
-            <a:avLst/>
-            <a:gdLst/>
-            <a:ahLst/>
-            <a:cxnLst/>
-            <a:rect l="l" t="t" r="r" b="b"/>
-            <a:pathLst>
-              <a:path w="10728325" h="3132136">
-                <a:moveTo>
-                  <a:pt x="0" y="0"/>
-                </a:moveTo>
-                <a:lnTo>
-                  <a:pt x="10728325" y="0"/>
-                </a:lnTo>
-                <a:lnTo>
-                  <a:pt x="10728325" y="3132136"/>
-                </a:lnTo>
-                <a:lnTo>
-                  <a:pt x="0" y="3132136"/>
-                </a:lnTo>
-                <a:close/>
-              </a:path>
-            </a:pathLst>
-          </a:custGeom>
-          <a:noFill/>
         </p:spPr>
-      </p:pic>
+        <p:txBody>
+          <a:bodyPr vert="horz" wrap="square" lIns="0" tIns="0" rIns="0" bIns="0" rtlCol="0" anchor="ctr" anchorCtr="0">
+            <a:normAutofit/>
+          </a:bodyPr>
+          <a:lstStyle/>
+          <a:p>
+            <a:pPr algn="ctr"/>
+            <a:r>
+              <a:rPr lang="en-US" sz="5600" spc="-100"/>
+              <a:t>References</a:t>
+            </a:r>
+          </a:p>
+        </p:txBody>
+      </p:sp>
+      <p:sp>
+        <p:nvSpPr>
+          <p:cNvPr id="3" name="Content Placeholder 2">
+            <a:extLst>
+              <a:ext uri="{FF2B5EF4-FFF2-40B4-BE49-F238E27FC236}">
+                <a16:creationId xmlns:a16="http://schemas.microsoft.com/office/drawing/2014/main" id="{35CCA2D0-6108-D449-B764-0B9AD6CF1E86}"/>
+              </a:ext>
+            </a:extLst>
+          </p:cNvPr>
+          <p:cNvSpPr>
+            <a:spLocks noGrp="1"/>
+          </p:cNvSpPr>
+          <p:nvPr>
+            <p:ph idx="1"/>
+          </p:nvPr>
+        </p:nvSpPr>
+        <p:spPr>
+          <a:xfrm>
+            <a:off x="2640014" y="4437899"/>
+            <a:ext cx="6911974" cy="990143"/>
+          </a:xfrm>
+        </p:spPr>
+        <p:txBody>
+          <a:bodyPr vert="horz" lIns="0" tIns="0" rIns="0" bIns="0" rtlCol="0">
+            <a:normAutofit/>
+          </a:bodyPr>
+          <a:lstStyle/>
+          <a:p>
+            <a:pPr marL="0" indent="0" algn="ctr">
+              <a:buNone/>
+            </a:pPr>
+            <a:r>
+              <a:rPr lang="en-US" sz="2600">
+                <a:solidFill>
+                  <a:schemeClr val="tx2">
+                    <a:lumMod val="90000"/>
+                  </a:schemeClr>
+                </a:solidFill>
+              </a:rPr>
+              <a:t>Git Repo Link: </a:t>
+            </a:r>
+            <a:r>
+              <a:rPr lang="en-US" sz="2600">
+                <a:solidFill>
+                  <a:schemeClr val="tx2">
+                    <a:lumMod val="90000"/>
+                  </a:schemeClr>
+                </a:solidFill>
+                <a:hlinkClick r:id="rId2"/>
+              </a:rPr>
+              <a:t>https://github.com/satish2902/photocapture</a:t>
+            </a:r>
+            <a:endParaRPr lang="en-US" sz="2600">
+              <a:solidFill>
+                <a:schemeClr val="tx2">
+                  <a:lumMod val="90000"/>
+                </a:schemeClr>
+              </a:solidFill>
+            </a:endParaRPr>
+          </a:p>
+        </p:txBody>
+      </p:sp>
       <p:sp useBgFill="1">
         <p:nvSpPr>
-          <p:cNvPr id="25" name="Freeform: Shape 24">
+          <p:cNvPr id="24" name="Freeform: Shape 23">
             <a:extLst>
               <a:ext uri="{FF2B5EF4-FFF2-40B4-BE49-F238E27FC236}">
-                <a16:creationId xmlns:a16="http://schemas.microsoft.com/office/drawing/2014/main" id="{61DBDC3E-EFBF-429B-957B-6C76FFB44963}"/>
+                <a16:creationId xmlns:a16="http://schemas.microsoft.com/office/drawing/2014/main" id="{085AB271-571D-4C19-9FCC-C760834A8937}"/>
               </a:ext>
               <a:ext uri="{C183D7F6-B498-43B3-948B-1728B52AA6E4}">
                 <adec:decorative xmlns:adec="http://schemas.microsoft.com/office/drawing/2017/decorative" val="1"/>
@@ -27836,36 +29551,36 @@
         </p:nvSpPr>
         <p:spPr bwMode="auto">
           <a:xfrm rot="5400000">
-            <a:off x="5693480" y="359481"/>
-            <a:ext cx="805041" cy="12192001"/>
+            <a:off x="5693226" y="359229"/>
+            <a:ext cx="805544" cy="12191999"/>
           </a:xfrm>
           <a:custGeom>
             <a:avLst/>
             <a:gdLst>
-              <a:gd name="connsiteX0" fmla="*/ 0 w 805041"/>
-              <a:gd name="connsiteY0" fmla="*/ 12192001 h 12192001"/>
-              <a:gd name="connsiteX1" fmla="*/ 2268 w 805041"/>
-              <a:gd name="connsiteY1" fmla="*/ 11635931 h 12192001"/>
-              <a:gd name="connsiteX2" fmla="*/ 39265 w 805041"/>
-              <a:gd name="connsiteY2" fmla="*/ 9246579 h 12192001"/>
-              <a:gd name="connsiteX3" fmla="*/ 79643 w 805041"/>
-              <a:gd name="connsiteY3" fmla="*/ 7976300 h 12192001"/>
-              <a:gd name="connsiteX4" fmla="*/ 39265 w 805041"/>
-              <a:gd name="connsiteY4" fmla="*/ 7150621 h 12192001"/>
-              <a:gd name="connsiteX5" fmla="*/ 39265 w 805041"/>
-              <a:gd name="connsiteY5" fmla="*/ 6515481 h 12192001"/>
-              <a:gd name="connsiteX6" fmla="*/ 39265 w 805041"/>
-              <a:gd name="connsiteY6" fmla="*/ 4864121 h 12192001"/>
-              <a:gd name="connsiteX7" fmla="*/ 79645 w 805041"/>
-              <a:gd name="connsiteY7" fmla="*/ 2958705 h 12192001"/>
-              <a:gd name="connsiteX8" fmla="*/ 54260 w 805041"/>
-              <a:gd name="connsiteY8" fmla="*/ 203487 h 12192001"/>
-              <a:gd name="connsiteX9" fmla="*/ 52385 w 805041"/>
-              <a:gd name="connsiteY9" fmla="*/ 0 h 12192001"/>
-              <a:gd name="connsiteX10" fmla="*/ 805041 w 805041"/>
-              <a:gd name="connsiteY10" fmla="*/ 0 h 12192001"/>
-              <a:gd name="connsiteX11" fmla="*/ 805040 w 805041"/>
-              <a:gd name="connsiteY11" fmla="*/ 12192001 h 12192001"/>
+              <a:gd name="connsiteX0" fmla="*/ 0 w 1214924"/>
+              <a:gd name="connsiteY0" fmla="*/ 12191999 h 12191999"/>
+              <a:gd name="connsiteX1" fmla="*/ 32 w 1214924"/>
+              <a:gd name="connsiteY1" fmla="*/ 12166053 h 12191999"/>
+              <a:gd name="connsiteX2" fmla="*/ 59979 w 1214924"/>
+              <a:gd name="connsiteY2" fmla="*/ 9224089 h 12191999"/>
+              <a:gd name="connsiteX3" fmla="*/ 120877 w 1214924"/>
+              <a:gd name="connsiteY3" fmla="*/ 8004225 h 12191999"/>
+              <a:gd name="connsiteX4" fmla="*/ 59979 w 1214924"/>
+              <a:gd name="connsiteY4" fmla="*/ 7211315 h 12191999"/>
+              <a:gd name="connsiteX5" fmla="*/ 59979 w 1214924"/>
+              <a:gd name="connsiteY5" fmla="*/ 6601383 h 12191999"/>
+              <a:gd name="connsiteX6" fmla="*/ 59979 w 1214924"/>
+              <a:gd name="connsiteY6" fmla="*/ 5015562 h 12191999"/>
+              <a:gd name="connsiteX7" fmla="*/ 120877 w 1214924"/>
+              <a:gd name="connsiteY7" fmla="*/ 3185768 h 12191999"/>
+              <a:gd name="connsiteX8" fmla="*/ 74847 w 1214924"/>
+              <a:gd name="connsiteY8" fmla="*/ 4714 h 12191999"/>
+              <a:gd name="connsiteX9" fmla="*/ 74778 w 1214924"/>
+              <a:gd name="connsiteY9" fmla="*/ 0 h 12191999"/>
+              <a:gd name="connsiteX10" fmla="*/ 1214924 w 1214924"/>
+              <a:gd name="connsiteY10" fmla="*/ 0 h 12191999"/>
+              <a:gd name="connsiteX11" fmla="*/ 1214924 w 1214924"/>
+              <a:gd name="connsiteY11" fmla="*/ 12191999 h 12191999"/>
             </a:gdLst>
             <a:ahLst/>
             <a:cxnLst>
@@ -27908,56 +29623,56 @@
             </a:cxnLst>
             <a:rect l="l" t="t" r="r" b="b"/>
             <a:pathLst>
-              <a:path w="805041" h="12192001">
+              <a:path w="1214924" h="12191999">
                 <a:moveTo>
-                  <a:pt x="0" y="12192001"/>
+                  <a:pt x="0" y="12191999"/>
                 </a:moveTo>
                 <a:lnTo>
-                  <a:pt x="2268" y="11635931"/>
+                  <a:pt x="32" y="12166053"/>
                 </a:lnTo>
                 <a:cubicBezTo>
-                  <a:pt x="6616" y="10932425"/>
-                  <a:pt x="16553" y="10139742"/>
-                  <a:pt x="39265" y="9246579"/>
+                  <a:pt x="2886" y="11339787"/>
+                  <a:pt x="14305" y="10367710"/>
+                  <a:pt x="59979" y="9224089"/>
                 </a:cubicBezTo>
                 <a:cubicBezTo>
-                  <a:pt x="79643" y="7976300"/>
-                  <a:pt x="79643" y="7976300"/>
-                  <a:pt x="79643" y="7976300"/>
+                  <a:pt x="120877" y="8004225"/>
+                  <a:pt x="120877" y="8004225"/>
+                  <a:pt x="120877" y="8004225"/>
                 </a:cubicBezTo>
                 <a:cubicBezTo>
-                  <a:pt x="79643" y="7722245"/>
-                  <a:pt x="39265" y="7468190"/>
-                  <a:pt x="39265" y="7150621"/>
+                  <a:pt x="120877" y="7760253"/>
+                  <a:pt x="59979" y="7516280"/>
+                  <a:pt x="59979" y="7211315"/>
                 </a:cubicBezTo>
                 <a:cubicBezTo>
-                  <a:pt x="39265" y="6833051"/>
-                  <a:pt x="39265" y="6578996"/>
-                  <a:pt x="39265" y="6515481"/>
+                  <a:pt x="59979" y="6906349"/>
+                  <a:pt x="59979" y="6662377"/>
+                  <a:pt x="59979" y="6601383"/>
                 </a:cubicBezTo>
                 <a:cubicBezTo>
-                  <a:pt x="39265" y="4864121"/>
-                  <a:pt x="39265" y="4864121"/>
-                  <a:pt x="39265" y="4864121"/>
+                  <a:pt x="59979" y="5015562"/>
+                  <a:pt x="59979" y="5015562"/>
+                  <a:pt x="59979" y="5015562"/>
                 </a:cubicBezTo>
                 <a:cubicBezTo>
-                  <a:pt x="79645" y="2958705"/>
-                  <a:pt x="79645" y="2958705"/>
-                  <a:pt x="79645" y="2958705"/>
+                  <a:pt x="120877" y="3185768"/>
+                  <a:pt x="120877" y="3185768"/>
+                  <a:pt x="120877" y="3185768"/>
                 </a:cubicBezTo>
                 <a:cubicBezTo>
-                  <a:pt x="68288" y="1726140"/>
-                  <a:pt x="60126" y="840233"/>
-                  <a:pt x="54260" y="203487"/>
+                  <a:pt x="98040" y="1607571"/>
+                  <a:pt x="83767" y="621197"/>
+                  <a:pt x="74847" y="4714"/>
                 </a:cubicBezTo>
                 <a:lnTo>
-                  <a:pt x="52385" y="0"/>
+                  <a:pt x="74778" y="0"/>
                 </a:lnTo>
                 <a:lnTo>
-                  <a:pt x="805041" y="0"/>
+                  <a:pt x="1214924" y="0"/>
                 </a:lnTo>
                 <a:lnTo>
-                  <a:pt x="805040" y="12192001"/>
+                  <a:pt x="1214924" y="12191999"/>
                 </a:lnTo>
                 <a:close/>
               </a:path>
@@ -27972,7 +29687,6 @@
             <a:prstTxWarp prst="textNoShape">
               <a:avLst/>
             </a:prstTxWarp>
-            <a:noAutofit/>
           </a:bodyPr>
           <a:lstStyle/>
           <a:p>
@@ -27983,7 +29697,7 @@
     </p:spTree>
     <p:extLst>
       <p:ext uri="{BB962C8B-B14F-4D97-AF65-F5344CB8AC3E}">
-        <p14:creationId xmlns:p14="http://schemas.microsoft.com/office/powerpoint/2010/main" val="1039646967"/>
+        <p14:creationId xmlns:p14="http://schemas.microsoft.com/office/powerpoint/2010/main" val="194401262"/>
       </p:ext>
     </p:extLst>
   </p:cSld>

</xml_diff>